<commit_message>
Membuat pareto pada Problem Analisys
</commit_message>
<xml_diff>
--- a/MAKALAH 2021.pptx
+++ b/MAKALAH 2021.pptx
@@ -4,6 +4,9 @@
   <p:sldMasterIdLst>
     <p:sldMasterId id="2147483648" r:id="rId1"/>
   </p:sldMasterIdLst>
+  <p:notesMasterIdLst>
+    <p:notesMasterId r:id="rId6"/>
+  </p:notesMasterIdLst>
   <p:sldIdLst>
     <p:sldId id="256" r:id="rId2"/>
     <p:sldId id="257" r:id="rId3"/>
@@ -107,7 +110,1667 @@
       </a:defRPr>
     </a:lvl9pPr>
   </p:defaultTextStyle>
+  <p:extLst>
+    <p:ext uri="{EFAFB233-063F-42B5-8137-9DF3F51BA10A}">
+      <p15:sldGuideLst xmlns:p15="http://schemas.microsoft.com/office/powerpoint/2012/main"/>
+    </p:ext>
+  </p:extLst>
 </p:presentation>
+</file>
+
+<file path=ppt/charts/chart1.xml><?xml version="1.0" encoding="utf-8"?>
+<c:chartSpace xmlns:c="http://schemas.openxmlformats.org/drawingml/2006/chart" xmlns:a="http://schemas.openxmlformats.org/drawingml/2006/main" xmlns:r="http://schemas.openxmlformats.org/officeDocument/2006/relationships" xmlns:c16r2="http://schemas.microsoft.com/office/drawing/2015/06/chart">
+  <c:date1904 val="0"/>
+  <c:lang val="en-US"/>
+  <c:roundedCorners val="0"/>
+  <mc:AlternateContent xmlns:mc="http://schemas.openxmlformats.org/markup-compatibility/2006">
+    <mc:Choice xmlns:c14="http://schemas.microsoft.com/office/drawing/2007/8/2/chart" Requires="c14">
+      <c14:style val="102"/>
+    </mc:Choice>
+    <mc:Fallback>
+      <c:style val="2"/>
+    </mc:Fallback>
+  </mc:AlternateContent>
+  <c:chart>
+    <c:autoTitleDeleted val="1"/>
+    <c:plotArea>
+      <c:layout/>
+      <c:barChart>
+        <c:barDir val="col"/>
+        <c:grouping val="clustered"/>
+        <c:varyColors val="0"/>
+        <c:ser>
+          <c:idx val="0"/>
+          <c:order val="0"/>
+          <c:spPr>
+            <a:solidFill>
+              <a:srgbClr val="FF0000"/>
+            </a:solidFill>
+            <a:ln>
+              <a:noFill/>
+            </a:ln>
+            <a:effectLst/>
+          </c:spPr>
+          <c:invertIfNegative val="0"/>
+          <c:dPt>
+            <c:idx val="4"/>
+            <c:invertIfNegative val="0"/>
+            <c:bubble3D val="0"/>
+            <c:spPr>
+              <a:solidFill>
+                <a:srgbClr val="0070C0"/>
+              </a:solidFill>
+              <a:ln>
+                <a:noFill/>
+              </a:ln>
+              <a:effectLst/>
+            </c:spPr>
+            <c:extLst>
+              <c:ext xmlns:c16="http://schemas.microsoft.com/office/drawing/2014/chart" uri="{C3380CC4-5D6E-409C-BE32-E72D297353CC}">
+                <c16:uniqueId val="{00000001-C464-47C6-9205-11CE060EE5C6}"/>
+              </c:ext>
+            </c:extLst>
+          </c:dPt>
+          <c:dLbls>
+            <c:dLbl>
+              <c:idx val="0"/>
+              <c:spPr>
+                <a:noFill/>
+                <a:ln>
+                  <a:noFill/>
+                </a:ln>
+                <a:effectLst/>
+              </c:spPr>
+              <c:txPr>
+                <a:bodyPr rot="0" spcFirstLastPara="1" vertOverflow="ellipsis" vert="horz" wrap="square" lIns="38100" tIns="19050" rIns="38100" bIns="19050" anchor="ctr" anchorCtr="1">
+                  <a:spAutoFit/>
+                </a:bodyPr>
+                <a:lstStyle/>
+                <a:p>
+                  <a:pPr>
+                    <a:defRPr sz="900" b="1" i="0" u="none" strike="noStrike" kern="1200" baseline="0">
+                      <a:solidFill>
+                        <a:srgbClr val="FF0000"/>
+                      </a:solidFill>
+                      <a:latin typeface="+mn-lt"/>
+                      <a:ea typeface="+mn-ea"/>
+                      <a:cs typeface="+mn-cs"/>
+                    </a:defRPr>
+                  </a:pPr>
+                  <a:endParaRPr lang="en-US"/>
+                </a:p>
+              </c:txPr>
+              <c:showLegendKey val="0"/>
+              <c:showVal val="1"/>
+              <c:showCatName val="0"/>
+              <c:showSerName val="0"/>
+              <c:showPercent val="0"/>
+              <c:showBubbleSize val="0"/>
+              <c:extLst>
+                <c:ext xmlns:c16="http://schemas.microsoft.com/office/drawing/2014/chart" uri="{C3380CC4-5D6E-409C-BE32-E72D297353CC}">
+                  <c16:uniqueId val="{00000002-C464-47C6-9205-11CE060EE5C6}"/>
+                </c:ext>
+              </c:extLst>
+            </c:dLbl>
+            <c:dLbl>
+              <c:idx val="1"/>
+              <c:spPr>
+                <a:noFill/>
+                <a:ln>
+                  <a:noFill/>
+                </a:ln>
+                <a:effectLst/>
+              </c:spPr>
+              <c:txPr>
+                <a:bodyPr rot="0" spcFirstLastPara="1" vertOverflow="ellipsis" vert="horz" wrap="square" lIns="38100" tIns="19050" rIns="38100" bIns="19050" anchor="ctr" anchorCtr="1">
+                  <a:spAutoFit/>
+                </a:bodyPr>
+                <a:lstStyle/>
+                <a:p>
+                  <a:pPr>
+                    <a:defRPr sz="900" b="1" i="0" u="none" strike="noStrike" kern="1200" baseline="0">
+                      <a:solidFill>
+                        <a:srgbClr val="FF0000"/>
+                      </a:solidFill>
+                      <a:latin typeface="+mn-lt"/>
+                      <a:ea typeface="+mn-ea"/>
+                      <a:cs typeface="+mn-cs"/>
+                    </a:defRPr>
+                  </a:pPr>
+                  <a:endParaRPr lang="en-US"/>
+                </a:p>
+              </c:txPr>
+              <c:showLegendKey val="0"/>
+              <c:showVal val="1"/>
+              <c:showCatName val="0"/>
+              <c:showSerName val="0"/>
+              <c:showPercent val="0"/>
+              <c:showBubbleSize val="0"/>
+              <c:extLst>
+                <c:ext xmlns:c16="http://schemas.microsoft.com/office/drawing/2014/chart" uri="{C3380CC4-5D6E-409C-BE32-E72D297353CC}">
+                  <c16:uniqueId val="{00000003-C464-47C6-9205-11CE060EE5C6}"/>
+                </c:ext>
+              </c:extLst>
+            </c:dLbl>
+            <c:dLbl>
+              <c:idx val="2"/>
+              <c:spPr>
+                <a:noFill/>
+                <a:ln>
+                  <a:noFill/>
+                </a:ln>
+                <a:effectLst/>
+              </c:spPr>
+              <c:txPr>
+                <a:bodyPr rot="0" spcFirstLastPara="1" vertOverflow="ellipsis" vert="horz" wrap="square" lIns="38100" tIns="19050" rIns="38100" bIns="19050" anchor="ctr" anchorCtr="1">
+                  <a:spAutoFit/>
+                </a:bodyPr>
+                <a:lstStyle/>
+                <a:p>
+                  <a:pPr>
+                    <a:defRPr sz="900" b="1" i="0" u="none" strike="noStrike" kern="1200" baseline="0">
+                      <a:solidFill>
+                        <a:srgbClr val="FF0000"/>
+                      </a:solidFill>
+                      <a:latin typeface="+mn-lt"/>
+                      <a:ea typeface="+mn-ea"/>
+                      <a:cs typeface="+mn-cs"/>
+                    </a:defRPr>
+                  </a:pPr>
+                  <a:endParaRPr lang="en-US"/>
+                </a:p>
+              </c:txPr>
+              <c:showLegendKey val="0"/>
+              <c:showVal val="1"/>
+              <c:showCatName val="0"/>
+              <c:showSerName val="0"/>
+              <c:showPercent val="0"/>
+              <c:showBubbleSize val="0"/>
+              <c:extLst>
+                <c:ext xmlns:c16="http://schemas.microsoft.com/office/drawing/2014/chart" uri="{C3380CC4-5D6E-409C-BE32-E72D297353CC}">
+                  <c16:uniqueId val="{00000004-C464-47C6-9205-11CE060EE5C6}"/>
+                </c:ext>
+              </c:extLst>
+            </c:dLbl>
+            <c:dLbl>
+              <c:idx val="3"/>
+              <c:spPr>
+                <a:noFill/>
+                <a:ln>
+                  <a:noFill/>
+                </a:ln>
+                <a:effectLst/>
+              </c:spPr>
+              <c:txPr>
+                <a:bodyPr rot="0" spcFirstLastPara="1" vertOverflow="ellipsis" vert="horz" wrap="square" lIns="38100" tIns="19050" rIns="38100" bIns="19050" anchor="ctr" anchorCtr="1">
+                  <a:spAutoFit/>
+                </a:bodyPr>
+                <a:lstStyle/>
+                <a:p>
+                  <a:pPr>
+                    <a:defRPr sz="900" b="1" i="0" u="none" strike="noStrike" kern="1200" baseline="0">
+                      <a:solidFill>
+                        <a:srgbClr val="FF0000"/>
+                      </a:solidFill>
+                      <a:latin typeface="+mn-lt"/>
+                      <a:ea typeface="+mn-ea"/>
+                      <a:cs typeface="+mn-cs"/>
+                    </a:defRPr>
+                  </a:pPr>
+                  <a:endParaRPr lang="en-US"/>
+                </a:p>
+              </c:txPr>
+              <c:showLegendKey val="0"/>
+              <c:showVal val="1"/>
+              <c:showCatName val="0"/>
+              <c:showSerName val="0"/>
+              <c:showPercent val="0"/>
+              <c:showBubbleSize val="0"/>
+              <c:extLst>
+                <c:ext xmlns:c16="http://schemas.microsoft.com/office/drawing/2014/chart" uri="{C3380CC4-5D6E-409C-BE32-E72D297353CC}">
+                  <c16:uniqueId val="{00000005-C464-47C6-9205-11CE060EE5C6}"/>
+                </c:ext>
+              </c:extLst>
+            </c:dLbl>
+            <c:spPr>
+              <a:noFill/>
+              <a:ln>
+                <a:noFill/>
+              </a:ln>
+              <a:effectLst/>
+            </c:spPr>
+            <c:txPr>
+              <a:bodyPr rot="0" spcFirstLastPara="1" vertOverflow="ellipsis" vert="horz" wrap="square" lIns="38100" tIns="19050" rIns="38100" bIns="19050" anchor="ctr" anchorCtr="1">
+                <a:spAutoFit/>
+              </a:bodyPr>
+              <a:lstStyle/>
+              <a:p>
+                <a:pPr>
+                  <a:defRPr sz="900" b="1" i="0" u="none" strike="noStrike" kern="1200" baseline="0">
+                    <a:solidFill>
+                      <a:srgbClr val="0070C0"/>
+                    </a:solidFill>
+                    <a:latin typeface="+mn-lt"/>
+                    <a:ea typeface="+mn-ea"/>
+                    <a:cs typeface="+mn-cs"/>
+                  </a:defRPr>
+                </a:pPr>
+                <a:endParaRPr lang="en-US"/>
+              </a:p>
+            </c:txPr>
+            <c:showLegendKey val="0"/>
+            <c:showVal val="1"/>
+            <c:showCatName val="0"/>
+            <c:showSerName val="0"/>
+            <c:showPercent val="0"/>
+            <c:showBubbleSize val="0"/>
+            <c:showLeaderLines val="0"/>
+            <c:extLst>
+              <c:ext xmlns:c15="http://schemas.microsoft.com/office/drawing/2012/chart" uri="{CE6537A1-D6FC-4f65-9D91-7224C49458BB}">
+                <c15:showLeaderLines val="1"/>
+                <c15:leaderLines>
+                  <c:spPr>
+                    <a:ln w="9525" cap="flat" cmpd="sng" algn="ctr">
+                      <a:solidFill>
+                        <a:schemeClr val="tx1">
+                          <a:lumMod val="35000"/>
+                          <a:lumOff val="65000"/>
+                        </a:schemeClr>
+                      </a:solidFill>
+                      <a:round/>
+                    </a:ln>
+                    <a:effectLst/>
+                  </c:spPr>
+                </c15:leaderLines>
+              </c:ext>
+            </c:extLst>
+          </c:dLbls>
+          <c:cat>
+            <c:strRef>
+              <c:f>Sheet1!$J$11:$J$15</c:f>
+              <c:strCache>
+                <c:ptCount val="5"/>
+                <c:pt idx="0">
+                  <c:v>EM Contribution</c:v>
+                </c:pt>
+                <c:pt idx="1">
+                  <c:v>App Rate</c:v>
+                </c:pt>
+                <c:pt idx="2">
+                  <c:v>Leadtime EM</c:v>
+                </c:pt>
+                <c:pt idx="3">
+                  <c:v>TMO Share</c:v>
+                </c:pt>
+                <c:pt idx="4">
+                  <c:v>Leadtime SBE</c:v>
+                </c:pt>
+              </c:strCache>
+            </c:strRef>
+          </c:cat>
+          <c:val>
+            <c:numRef>
+              <c:f>Sheet1!$L$11:$L$15</c:f>
+              <c:numCache>
+                <c:formatCode>0%</c:formatCode>
+                <c:ptCount val="5"/>
+                <c:pt idx="0">
+                  <c:v>5.8139534883720929E-3</c:v>
+                </c:pt>
+                <c:pt idx="1">
+                  <c:v>0.20348837209302326</c:v>
+                </c:pt>
+                <c:pt idx="2">
+                  <c:v>0.24127906976744184</c:v>
+                </c:pt>
+                <c:pt idx="3">
+                  <c:v>0.27034883720930236</c:v>
+                </c:pt>
+                <c:pt idx="4">
+                  <c:v>0.27906976744186046</c:v>
+                </c:pt>
+              </c:numCache>
+            </c:numRef>
+          </c:val>
+          <c:extLst>
+            <c:ext xmlns:c16="http://schemas.microsoft.com/office/drawing/2014/chart" uri="{C3380CC4-5D6E-409C-BE32-E72D297353CC}">
+              <c16:uniqueId val="{00000006-C464-47C6-9205-11CE060EE5C6}"/>
+            </c:ext>
+          </c:extLst>
+        </c:ser>
+        <c:dLbls>
+          <c:showLegendKey val="0"/>
+          <c:showVal val="0"/>
+          <c:showCatName val="0"/>
+          <c:showSerName val="0"/>
+          <c:showPercent val="0"/>
+          <c:showBubbleSize val="0"/>
+        </c:dLbls>
+        <c:gapWidth val="150"/>
+        <c:axId val="472186960"/>
+        <c:axId val="472181712"/>
+      </c:barChart>
+      <c:lineChart>
+        <c:grouping val="standard"/>
+        <c:varyColors val="0"/>
+        <c:ser>
+          <c:idx val="1"/>
+          <c:order val="1"/>
+          <c:spPr>
+            <a:ln w="28575" cap="rnd">
+              <a:solidFill>
+                <a:schemeClr val="accent2"/>
+              </a:solidFill>
+              <a:round/>
+            </a:ln>
+            <a:effectLst/>
+          </c:spPr>
+          <c:marker>
+            <c:symbol val="none"/>
+          </c:marker>
+          <c:dLbls>
+            <c:spPr>
+              <a:solidFill>
+                <a:schemeClr val="accent6">
+                  <a:lumMod val="40000"/>
+                  <a:lumOff val="60000"/>
+                </a:schemeClr>
+              </a:solidFill>
+              <a:ln>
+                <a:noFill/>
+              </a:ln>
+              <a:effectLst/>
+            </c:spPr>
+            <c:txPr>
+              <a:bodyPr rot="0" spcFirstLastPara="1" vertOverflow="ellipsis" vert="horz" wrap="square" lIns="38100" tIns="19050" rIns="38100" bIns="19050" anchor="ctr" anchorCtr="1">
+                <a:spAutoFit/>
+              </a:bodyPr>
+              <a:lstStyle/>
+              <a:p>
+                <a:pPr>
+                  <a:defRPr sz="900" b="1" i="0" u="none" strike="noStrike" kern="1200" baseline="0">
+                    <a:solidFill>
+                      <a:schemeClr val="tx1">
+                        <a:lumMod val="75000"/>
+                        <a:lumOff val="25000"/>
+                      </a:schemeClr>
+                    </a:solidFill>
+                    <a:latin typeface="+mn-lt"/>
+                    <a:ea typeface="+mn-ea"/>
+                    <a:cs typeface="+mn-cs"/>
+                  </a:defRPr>
+                </a:pPr>
+                <a:endParaRPr lang="en-US"/>
+              </a:p>
+            </c:txPr>
+            <c:showLegendKey val="0"/>
+            <c:showVal val="1"/>
+            <c:showCatName val="0"/>
+            <c:showSerName val="0"/>
+            <c:showPercent val="0"/>
+            <c:showBubbleSize val="0"/>
+            <c:showLeaderLines val="0"/>
+            <c:extLst>
+              <c:ext xmlns:c15="http://schemas.microsoft.com/office/drawing/2012/chart" uri="{CE6537A1-D6FC-4f65-9D91-7224C49458BB}">
+                <c15:showLeaderLines val="1"/>
+                <c15:leaderLines>
+                  <c:spPr>
+                    <a:ln w="9525" cap="flat" cmpd="sng" algn="ctr">
+                      <a:solidFill>
+                        <a:schemeClr val="tx1">
+                          <a:lumMod val="35000"/>
+                          <a:lumOff val="65000"/>
+                        </a:schemeClr>
+                      </a:solidFill>
+                      <a:round/>
+                    </a:ln>
+                    <a:effectLst/>
+                  </c:spPr>
+                </c15:leaderLines>
+              </c:ext>
+            </c:extLst>
+          </c:dLbls>
+          <c:cat>
+            <c:strRef>
+              <c:f>Sheet1!$J$11:$J$15</c:f>
+              <c:strCache>
+                <c:ptCount val="5"/>
+                <c:pt idx="0">
+                  <c:v>EM Contribution</c:v>
+                </c:pt>
+                <c:pt idx="1">
+                  <c:v>App Rate</c:v>
+                </c:pt>
+                <c:pt idx="2">
+                  <c:v>Leadtime EM</c:v>
+                </c:pt>
+                <c:pt idx="3">
+                  <c:v>TMO Share</c:v>
+                </c:pt>
+                <c:pt idx="4">
+                  <c:v>Leadtime SBE</c:v>
+                </c:pt>
+              </c:strCache>
+            </c:strRef>
+          </c:cat>
+          <c:val>
+            <c:numRef>
+              <c:f>Sheet1!$M$11:$M$15</c:f>
+              <c:numCache>
+                <c:formatCode>0%</c:formatCode>
+                <c:ptCount val="5"/>
+                <c:pt idx="0">
+                  <c:v>0.01</c:v>
+                </c:pt>
+                <c:pt idx="1">
+                  <c:v>0.21348837209302327</c:v>
+                </c:pt>
+                <c:pt idx="2">
+                  <c:v>0.45476744186046514</c:v>
+                </c:pt>
+                <c:pt idx="3">
+                  <c:v>0.7251162790697675</c:v>
+                </c:pt>
+                <c:pt idx="4">
+                  <c:v>1.0041860465116279</c:v>
+                </c:pt>
+              </c:numCache>
+            </c:numRef>
+          </c:val>
+          <c:smooth val="0"/>
+          <c:extLst>
+            <c:ext xmlns:c16="http://schemas.microsoft.com/office/drawing/2014/chart" uri="{C3380CC4-5D6E-409C-BE32-E72D297353CC}">
+              <c16:uniqueId val="{00000007-C464-47C6-9205-11CE060EE5C6}"/>
+            </c:ext>
+          </c:extLst>
+        </c:ser>
+        <c:dLbls>
+          <c:showLegendKey val="0"/>
+          <c:showVal val="0"/>
+          <c:showCatName val="0"/>
+          <c:showSerName val="0"/>
+          <c:showPercent val="0"/>
+          <c:showBubbleSize val="0"/>
+        </c:dLbls>
+        <c:marker val="1"/>
+        <c:smooth val="0"/>
+        <c:axId val="462257256"/>
+        <c:axId val="468765160"/>
+      </c:lineChart>
+      <c:catAx>
+        <c:axId val="472186960"/>
+        <c:scaling>
+          <c:orientation val="minMax"/>
+        </c:scaling>
+        <c:delete val="0"/>
+        <c:axPos val="b"/>
+        <c:numFmt formatCode="General" sourceLinked="1"/>
+        <c:majorTickMark val="none"/>
+        <c:minorTickMark val="none"/>
+        <c:tickLblPos val="nextTo"/>
+        <c:spPr>
+          <a:noFill/>
+          <a:ln w="9525" cap="flat" cmpd="sng" algn="ctr">
+            <a:solidFill>
+              <a:schemeClr val="tx1">
+                <a:lumMod val="15000"/>
+                <a:lumOff val="85000"/>
+              </a:schemeClr>
+            </a:solidFill>
+            <a:round/>
+          </a:ln>
+          <a:effectLst/>
+        </c:spPr>
+        <c:txPr>
+          <a:bodyPr rot="-60000000" spcFirstLastPara="1" vertOverflow="ellipsis" vert="horz" wrap="square" anchor="ctr" anchorCtr="1"/>
+          <a:lstStyle/>
+          <a:p>
+            <a:pPr>
+              <a:defRPr sz="1000" b="1" i="0" u="none" strike="noStrike" kern="1200" baseline="0">
+                <a:solidFill>
+                  <a:schemeClr val="tx1">
+                    <a:lumMod val="65000"/>
+                    <a:lumOff val="35000"/>
+                  </a:schemeClr>
+                </a:solidFill>
+                <a:latin typeface="+mn-lt"/>
+                <a:ea typeface="+mn-ea"/>
+                <a:cs typeface="+mn-cs"/>
+              </a:defRPr>
+            </a:pPr>
+            <a:endParaRPr lang="en-US"/>
+          </a:p>
+        </c:txPr>
+        <c:crossAx val="472181712"/>
+        <c:crosses val="autoZero"/>
+        <c:auto val="1"/>
+        <c:lblAlgn val="ctr"/>
+        <c:lblOffset val="100"/>
+        <c:noMultiLvlLbl val="0"/>
+      </c:catAx>
+      <c:valAx>
+        <c:axId val="472181712"/>
+        <c:scaling>
+          <c:orientation val="minMax"/>
+          <c:max val="1"/>
+        </c:scaling>
+        <c:delete val="0"/>
+        <c:axPos val="l"/>
+        <c:numFmt formatCode="0%" sourceLinked="1"/>
+        <c:majorTickMark val="none"/>
+        <c:minorTickMark val="none"/>
+        <c:tickLblPos val="nextTo"/>
+        <c:spPr>
+          <a:noFill/>
+          <a:ln>
+            <a:noFill/>
+          </a:ln>
+          <a:effectLst/>
+        </c:spPr>
+        <c:txPr>
+          <a:bodyPr rot="-60000000" spcFirstLastPara="1" vertOverflow="ellipsis" vert="horz" wrap="square" anchor="ctr" anchorCtr="1"/>
+          <a:lstStyle/>
+          <a:p>
+            <a:pPr>
+              <a:defRPr sz="900" b="0" i="0" u="none" strike="noStrike" kern="1200" baseline="0">
+                <a:solidFill>
+                  <a:schemeClr val="tx1">
+                    <a:lumMod val="65000"/>
+                    <a:lumOff val="35000"/>
+                  </a:schemeClr>
+                </a:solidFill>
+                <a:latin typeface="+mn-lt"/>
+                <a:ea typeface="+mn-ea"/>
+                <a:cs typeface="+mn-cs"/>
+              </a:defRPr>
+            </a:pPr>
+            <a:endParaRPr lang="en-US"/>
+          </a:p>
+        </c:txPr>
+        <c:crossAx val="472186960"/>
+        <c:crosses val="autoZero"/>
+        <c:crossBetween val="between"/>
+        <c:majorUnit val="0.2"/>
+      </c:valAx>
+      <c:valAx>
+        <c:axId val="468765160"/>
+        <c:scaling>
+          <c:orientation val="minMax"/>
+        </c:scaling>
+        <c:delete val="0"/>
+        <c:axPos val="r"/>
+        <c:numFmt formatCode="0%" sourceLinked="1"/>
+        <c:majorTickMark val="out"/>
+        <c:minorTickMark val="none"/>
+        <c:tickLblPos val="nextTo"/>
+        <c:spPr>
+          <a:noFill/>
+          <a:ln>
+            <a:noFill/>
+          </a:ln>
+          <a:effectLst/>
+        </c:spPr>
+        <c:txPr>
+          <a:bodyPr rot="-60000000" spcFirstLastPara="1" vertOverflow="ellipsis" vert="horz" wrap="square" anchor="ctr" anchorCtr="1"/>
+          <a:lstStyle/>
+          <a:p>
+            <a:pPr>
+              <a:defRPr sz="900" b="0" i="0" u="none" strike="noStrike" kern="1200" baseline="0">
+                <a:solidFill>
+                  <a:schemeClr val="tx1">
+                    <a:lumMod val="65000"/>
+                    <a:lumOff val="35000"/>
+                  </a:schemeClr>
+                </a:solidFill>
+                <a:latin typeface="+mn-lt"/>
+                <a:ea typeface="+mn-ea"/>
+                <a:cs typeface="+mn-cs"/>
+              </a:defRPr>
+            </a:pPr>
+            <a:endParaRPr lang="en-US"/>
+          </a:p>
+        </c:txPr>
+        <c:crossAx val="462257256"/>
+        <c:crosses val="max"/>
+        <c:crossBetween val="between"/>
+      </c:valAx>
+      <c:catAx>
+        <c:axId val="462257256"/>
+        <c:scaling>
+          <c:orientation val="minMax"/>
+        </c:scaling>
+        <c:delete val="1"/>
+        <c:axPos val="b"/>
+        <c:numFmt formatCode="General" sourceLinked="1"/>
+        <c:majorTickMark val="out"/>
+        <c:minorTickMark val="none"/>
+        <c:tickLblPos val="nextTo"/>
+        <c:crossAx val="468765160"/>
+        <c:crosses val="autoZero"/>
+        <c:auto val="1"/>
+        <c:lblAlgn val="ctr"/>
+        <c:lblOffset val="100"/>
+        <c:noMultiLvlLbl val="0"/>
+      </c:catAx>
+      <c:spPr>
+        <a:noFill/>
+        <a:ln>
+          <a:noFill/>
+        </a:ln>
+        <a:effectLst/>
+      </c:spPr>
+    </c:plotArea>
+    <c:plotVisOnly val="1"/>
+    <c:dispBlanksAs val="gap"/>
+    <c:extLst>
+      <c:ext xmlns:c16r3="http://schemas.microsoft.com/office/drawing/2017/03/chart" uri="{56B9EC1D-385E-4148-901F-78D8002777C0}">
+        <c16r3:dataDisplayOptions16>
+          <c16r3:dispNaAsBlank val="1"/>
+        </c16r3:dataDisplayOptions16>
+      </c:ext>
+    </c:extLst>
+    <c:showDLblsOverMax val="0"/>
+  </c:chart>
+  <c:spPr>
+    <a:noFill/>
+    <a:ln>
+      <a:noFill/>
+    </a:ln>
+    <a:effectLst/>
+  </c:spPr>
+  <c:txPr>
+    <a:bodyPr/>
+    <a:lstStyle/>
+    <a:p>
+      <a:pPr>
+        <a:defRPr/>
+      </a:pPr>
+      <a:endParaRPr lang="en-US"/>
+    </a:p>
+  </c:txPr>
+  <c:externalData r:id="rId3">
+    <c:autoUpdate val="0"/>
+  </c:externalData>
+</c:chartSpace>
+</file>
+
+<file path=ppt/charts/colors1.xml><?xml version="1.0" encoding="utf-8"?>
+<cs:colorStyle xmlns:cs="http://schemas.microsoft.com/office/drawing/2012/chartStyle" xmlns:a="http://schemas.openxmlformats.org/drawingml/2006/main" meth="cycle" id="10">
+  <a:schemeClr val="accent1"/>
+  <a:schemeClr val="accent2"/>
+  <a:schemeClr val="accent3"/>
+  <a:schemeClr val="accent4"/>
+  <a:schemeClr val="accent5"/>
+  <a:schemeClr val="accent6"/>
+  <cs:variation/>
+  <cs:variation>
+    <a:lumMod val="60000"/>
+  </cs:variation>
+  <cs:variation>
+    <a:lumMod val="80000"/>
+    <a:lumOff val="20000"/>
+  </cs:variation>
+  <cs:variation>
+    <a:lumMod val="80000"/>
+  </cs:variation>
+  <cs:variation>
+    <a:lumMod val="60000"/>
+    <a:lumOff val="40000"/>
+  </cs:variation>
+  <cs:variation>
+    <a:lumMod val="50000"/>
+  </cs:variation>
+  <cs:variation>
+    <a:lumMod val="70000"/>
+    <a:lumOff val="30000"/>
+  </cs:variation>
+  <cs:variation>
+    <a:lumMod val="70000"/>
+  </cs:variation>
+  <cs:variation>
+    <a:lumMod val="50000"/>
+    <a:lumOff val="50000"/>
+  </cs:variation>
+</cs:colorStyle>
+</file>
+
+<file path=ppt/charts/style1.xml><?xml version="1.0" encoding="utf-8"?>
+<cs:chartStyle xmlns:cs="http://schemas.microsoft.com/office/drawing/2012/chartStyle" xmlns:a="http://schemas.openxmlformats.org/drawingml/2006/main" id="297">
+  <cs:axisTitle>
+    <cs:lnRef idx="0"/>
+    <cs:fillRef idx="0"/>
+    <cs:effectRef idx="0"/>
+    <cs:fontRef idx="minor">
+      <a:schemeClr val="tx1">
+        <a:lumMod val="65000"/>
+        <a:lumOff val="35000"/>
+      </a:schemeClr>
+    </cs:fontRef>
+    <cs:defRPr sz="1000" kern="1200"/>
+  </cs:axisTitle>
+  <cs:categoryAxis>
+    <cs:lnRef idx="0"/>
+    <cs:fillRef idx="0"/>
+    <cs:effectRef idx="0"/>
+    <cs:fontRef idx="minor">
+      <a:schemeClr val="tx1">
+        <a:lumMod val="65000"/>
+        <a:lumOff val="35000"/>
+      </a:schemeClr>
+    </cs:fontRef>
+    <cs:spPr>
+      <a:ln w="9525" cap="flat" cmpd="sng" algn="ctr">
+        <a:solidFill>
+          <a:schemeClr val="tx1">
+            <a:lumMod val="15000"/>
+            <a:lumOff val="85000"/>
+          </a:schemeClr>
+        </a:solidFill>
+        <a:round/>
+      </a:ln>
+    </cs:spPr>
+    <cs:defRPr sz="900" kern="1200"/>
+  </cs:categoryAxis>
+  <cs:chartArea mods="allowNoFillOverride allowNoLineOverride">
+    <cs:lnRef idx="0"/>
+    <cs:fillRef idx="0"/>
+    <cs:effectRef idx="0"/>
+    <cs:fontRef idx="minor">
+      <a:schemeClr val="tx1"/>
+    </cs:fontRef>
+    <cs:spPr>
+      <a:solidFill>
+        <a:schemeClr val="bg1"/>
+      </a:solidFill>
+      <a:ln w="9525" cap="flat" cmpd="sng" algn="ctr">
+        <a:solidFill>
+          <a:schemeClr val="tx1">
+            <a:lumMod val="15000"/>
+            <a:lumOff val="85000"/>
+          </a:schemeClr>
+        </a:solidFill>
+        <a:round/>
+      </a:ln>
+    </cs:spPr>
+    <cs:defRPr sz="1000" kern="1200"/>
+  </cs:chartArea>
+  <cs:dataLabel>
+    <cs:lnRef idx="0"/>
+    <cs:fillRef idx="0"/>
+    <cs:effectRef idx="0"/>
+    <cs:fontRef idx="minor">
+      <a:schemeClr val="tx1">
+        <a:lumMod val="75000"/>
+        <a:lumOff val="25000"/>
+      </a:schemeClr>
+    </cs:fontRef>
+    <cs:defRPr sz="900" kern="1200"/>
+  </cs:dataLabel>
+  <cs:dataLabelCallout>
+    <cs:lnRef idx="0"/>
+    <cs:fillRef idx="0"/>
+    <cs:effectRef idx="0"/>
+    <cs:fontRef idx="minor">
+      <a:schemeClr val="dk1">
+        <a:lumMod val="65000"/>
+        <a:lumOff val="35000"/>
+      </a:schemeClr>
+    </cs:fontRef>
+    <cs:spPr>
+      <a:solidFill>
+        <a:schemeClr val="lt1"/>
+      </a:solidFill>
+      <a:ln>
+        <a:solidFill>
+          <a:schemeClr val="dk1">
+            <a:lumMod val="25000"/>
+            <a:lumOff val="75000"/>
+          </a:schemeClr>
+        </a:solidFill>
+      </a:ln>
+    </cs:spPr>
+    <cs:defRPr sz="900" kern="1200"/>
+    <cs:bodyPr rot="0" spcFirstLastPara="1" vertOverflow="clip" horzOverflow="clip" vert="horz" wrap="square" lIns="36576" tIns="18288" rIns="36576" bIns="18288" anchor="ctr" anchorCtr="1">
+      <a:spAutoFit/>
+    </cs:bodyPr>
+  </cs:dataLabelCallout>
+  <cs:dataPoint>
+    <cs:lnRef idx="0"/>
+    <cs:fillRef idx="1">
+      <cs:styleClr val="auto"/>
+    </cs:fillRef>
+    <cs:effectRef idx="0"/>
+    <cs:fontRef idx="minor">
+      <a:schemeClr val="tx1"/>
+    </cs:fontRef>
+  </cs:dataPoint>
+  <cs:dataPoint3D>
+    <cs:lnRef idx="0"/>
+    <cs:fillRef idx="1">
+      <cs:styleClr val="auto"/>
+    </cs:fillRef>
+    <cs:effectRef idx="0"/>
+    <cs:fontRef idx="minor">
+      <a:schemeClr val="tx1"/>
+    </cs:fontRef>
+  </cs:dataPoint3D>
+  <cs:dataPointLine>
+    <cs:lnRef idx="0">
+      <cs:styleClr val="auto"/>
+    </cs:lnRef>
+    <cs:fillRef idx="1"/>
+    <cs:effectRef idx="0"/>
+    <cs:fontRef idx="minor">
+      <a:schemeClr val="tx1"/>
+    </cs:fontRef>
+    <cs:spPr>
+      <a:ln w="28575" cap="rnd">
+        <a:solidFill>
+          <a:schemeClr val="phClr"/>
+        </a:solidFill>
+        <a:round/>
+      </a:ln>
+    </cs:spPr>
+  </cs:dataPointLine>
+  <cs:dataPointMarker>
+    <cs:lnRef idx="0">
+      <cs:styleClr val="auto"/>
+    </cs:lnRef>
+    <cs:fillRef idx="1">
+      <cs:styleClr val="auto"/>
+    </cs:fillRef>
+    <cs:effectRef idx="0"/>
+    <cs:fontRef idx="minor">
+      <a:schemeClr val="tx1"/>
+    </cs:fontRef>
+    <cs:spPr>
+      <a:ln w="9525">
+        <a:solidFill>
+          <a:schemeClr val="phClr"/>
+        </a:solidFill>
+      </a:ln>
+    </cs:spPr>
+  </cs:dataPointMarker>
+  <cs:dataPointMarkerLayout symbol="circle" size="5"/>
+  <cs:dataPointWireframe>
+    <cs:lnRef idx="0">
+      <cs:styleClr val="auto"/>
+    </cs:lnRef>
+    <cs:fillRef idx="1"/>
+    <cs:effectRef idx="0"/>
+    <cs:fontRef idx="minor">
+      <a:schemeClr val="tx1"/>
+    </cs:fontRef>
+    <cs:spPr>
+      <a:ln w="9525" cap="rnd">
+        <a:solidFill>
+          <a:schemeClr val="phClr"/>
+        </a:solidFill>
+        <a:round/>
+      </a:ln>
+    </cs:spPr>
+  </cs:dataPointWireframe>
+  <cs:dataTable>
+    <cs:lnRef idx="0"/>
+    <cs:fillRef idx="0"/>
+    <cs:effectRef idx="0"/>
+    <cs:fontRef idx="minor">
+      <a:schemeClr val="tx1">
+        <a:lumMod val="65000"/>
+        <a:lumOff val="35000"/>
+      </a:schemeClr>
+    </cs:fontRef>
+    <cs:spPr>
+      <a:noFill/>
+      <a:ln w="9525" cap="flat" cmpd="sng" algn="ctr">
+        <a:solidFill>
+          <a:schemeClr val="tx1">
+            <a:lumMod val="15000"/>
+            <a:lumOff val="85000"/>
+          </a:schemeClr>
+        </a:solidFill>
+        <a:round/>
+      </a:ln>
+    </cs:spPr>
+    <cs:defRPr sz="900" kern="1200"/>
+  </cs:dataTable>
+  <cs:downBar>
+    <cs:lnRef idx="0"/>
+    <cs:fillRef idx="0"/>
+    <cs:effectRef idx="0"/>
+    <cs:fontRef idx="minor">
+      <a:schemeClr val="tx1"/>
+    </cs:fontRef>
+    <cs:spPr>
+      <a:solidFill>
+        <a:schemeClr val="dk1">
+          <a:lumMod val="75000"/>
+          <a:lumOff val="25000"/>
+        </a:schemeClr>
+      </a:solidFill>
+      <a:ln w="9525" cap="flat" cmpd="sng" algn="ctr">
+        <a:solidFill>
+          <a:schemeClr val="tx1">
+            <a:lumMod val="65000"/>
+            <a:lumOff val="35000"/>
+          </a:schemeClr>
+        </a:solidFill>
+        <a:round/>
+      </a:ln>
+    </cs:spPr>
+  </cs:downBar>
+  <cs:dropLine>
+    <cs:lnRef idx="0"/>
+    <cs:fillRef idx="0"/>
+    <cs:effectRef idx="0"/>
+    <cs:fontRef idx="minor">
+      <a:schemeClr val="tx1"/>
+    </cs:fontRef>
+    <cs:spPr>
+      <a:ln w="9525" cap="flat" cmpd="sng" algn="ctr">
+        <a:solidFill>
+          <a:schemeClr val="tx1">
+            <a:lumMod val="35000"/>
+            <a:lumOff val="65000"/>
+          </a:schemeClr>
+        </a:solidFill>
+        <a:round/>
+      </a:ln>
+    </cs:spPr>
+  </cs:dropLine>
+  <cs:errorBar>
+    <cs:lnRef idx="0"/>
+    <cs:fillRef idx="0"/>
+    <cs:effectRef idx="0"/>
+    <cs:fontRef idx="minor">
+      <a:schemeClr val="tx1"/>
+    </cs:fontRef>
+    <cs:spPr>
+      <a:ln w="9525" cap="flat" cmpd="sng" algn="ctr">
+        <a:solidFill>
+          <a:schemeClr val="tx1">
+            <a:lumMod val="65000"/>
+            <a:lumOff val="35000"/>
+          </a:schemeClr>
+        </a:solidFill>
+        <a:round/>
+      </a:ln>
+    </cs:spPr>
+  </cs:errorBar>
+  <cs:floor>
+    <cs:lnRef idx="0"/>
+    <cs:fillRef idx="0"/>
+    <cs:effectRef idx="0"/>
+    <cs:fontRef idx="minor">
+      <a:schemeClr val="tx1"/>
+    </cs:fontRef>
+    <cs:spPr>
+      <a:noFill/>
+      <a:ln>
+        <a:noFill/>
+      </a:ln>
+    </cs:spPr>
+  </cs:floor>
+  <cs:gridlineMajor>
+    <cs:lnRef idx="0"/>
+    <cs:fillRef idx="0"/>
+    <cs:effectRef idx="0"/>
+    <cs:fontRef idx="minor">
+      <a:schemeClr val="tx1"/>
+    </cs:fontRef>
+    <cs:spPr>
+      <a:ln w="9525" cap="flat" cmpd="sng" algn="ctr">
+        <a:solidFill>
+          <a:schemeClr val="tx1">
+            <a:lumMod val="15000"/>
+            <a:lumOff val="85000"/>
+          </a:schemeClr>
+        </a:solidFill>
+        <a:round/>
+      </a:ln>
+    </cs:spPr>
+  </cs:gridlineMajor>
+  <cs:gridlineMinor>
+    <cs:lnRef idx="0"/>
+    <cs:fillRef idx="0"/>
+    <cs:effectRef idx="0"/>
+    <cs:fontRef idx="minor">
+      <a:schemeClr val="tx1"/>
+    </cs:fontRef>
+    <cs:spPr>
+      <a:ln w="9525" cap="flat" cmpd="sng" algn="ctr">
+        <a:solidFill>
+          <a:schemeClr val="tx1">
+            <a:lumMod val="5000"/>
+            <a:lumOff val="95000"/>
+          </a:schemeClr>
+        </a:solidFill>
+        <a:round/>
+      </a:ln>
+    </cs:spPr>
+  </cs:gridlineMinor>
+  <cs:hiLoLine>
+    <cs:lnRef idx="0"/>
+    <cs:fillRef idx="0"/>
+    <cs:effectRef idx="0"/>
+    <cs:fontRef idx="minor">
+      <a:schemeClr val="tx1"/>
+    </cs:fontRef>
+    <cs:spPr>
+      <a:ln w="9525" cap="flat" cmpd="sng" algn="ctr">
+        <a:solidFill>
+          <a:schemeClr val="tx1">
+            <a:lumMod val="50000"/>
+            <a:lumOff val="50000"/>
+          </a:schemeClr>
+        </a:solidFill>
+        <a:round/>
+      </a:ln>
+    </cs:spPr>
+  </cs:hiLoLine>
+  <cs:leaderLine>
+    <cs:lnRef idx="0"/>
+    <cs:fillRef idx="0"/>
+    <cs:effectRef idx="0"/>
+    <cs:fontRef idx="minor">
+      <a:schemeClr val="tx1"/>
+    </cs:fontRef>
+    <cs:spPr>
+      <a:ln w="9525" cap="flat" cmpd="sng" algn="ctr">
+        <a:solidFill>
+          <a:schemeClr val="tx1">
+            <a:lumMod val="35000"/>
+            <a:lumOff val="65000"/>
+          </a:schemeClr>
+        </a:solidFill>
+        <a:round/>
+      </a:ln>
+    </cs:spPr>
+  </cs:leaderLine>
+  <cs:legend>
+    <cs:lnRef idx="0"/>
+    <cs:fillRef idx="0"/>
+    <cs:effectRef idx="0"/>
+    <cs:fontRef idx="minor">
+      <a:schemeClr val="tx1">
+        <a:lumMod val="65000"/>
+        <a:lumOff val="35000"/>
+      </a:schemeClr>
+    </cs:fontRef>
+    <cs:defRPr sz="900" kern="1200"/>
+  </cs:legend>
+  <cs:plotArea mods="allowNoFillOverride allowNoLineOverride">
+    <cs:lnRef idx="0"/>
+    <cs:fillRef idx="0"/>
+    <cs:effectRef idx="0"/>
+    <cs:fontRef idx="minor">
+      <a:schemeClr val="tx1"/>
+    </cs:fontRef>
+  </cs:plotArea>
+  <cs:plotArea3D mods="allowNoFillOverride allowNoLineOverride">
+    <cs:lnRef idx="0"/>
+    <cs:fillRef idx="0"/>
+    <cs:effectRef idx="0"/>
+    <cs:fontRef idx="minor">
+      <a:schemeClr val="tx1"/>
+    </cs:fontRef>
+  </cs:plotArea3D>
+  <cs:seriesAxis>
+    <cs:lnRef idx="0"/>
+    <cs:fillRef idx="0"/>
+    <cs:effectRef idx="0"/>
+    <cs:fontRef idx="minor">
+      <a:schemeClr val="tx1">
+        <a:lumMod val="65000"/>
+        <a:lumOff val="35000"/>
+      </a:schemeClr>
+    </cs:fontRef>
+    <cs:defRPr sz="900" kern="1200"/>
+  </cs:seriesAxis>
+  <cs:seriesLine>
+    <cs:lnRef idx="0"/>
+    <cs:fillRef idx="0"/>
+    <cs:effectRef idx="0"/>
+    <cs:fontRef idx="minor">
+      <a:schemeClr val="tx1"/>
+    </cs:fontRef>
+    <cs:spPr>
+      <a:ln w="9525" cap="flat" cmpd="sng" algn="ctr">
+        <a:solidFill>
+          <a:schemeClr val="tx1">
+            <a:lumMod val="35000"/>
+            <a:lumOff val="65000"/>
+          </a:schemeClr>
+        </a:solidFill>
+        <a:round/>
+      </a:ln>
+    </cs:spPr>
+  </cs:seriesLine>
+  <cs:title>
+    <cs:lnRef idx="0"/>
+    <cs:fillRef idx="0"/>
+    <cs:effectRef idx="0"/>
+    <cs:fontRef idx="minor">
+      <a:schemeClr val="tx1">
+        <a:lumMod val="65000"/>
+        <a:lumOff val="35000"/>
+      </a:schemeClr>
+    </cs:fontRef>
+    <cs:defRPr sz="1400" b="0" kern="1200" spc="0" baseline="0"/>
+  </cs:title>
+  <cs:trendline>
+    <cs:lnRef idx="0">
+      <cs:styleClr val="auto"/>
+    </cs:lnRef>
+    <cs:fillRef idx="0"/>
+    <cs:effectRef idx="0"/>
+    <cs:fontRef idx="minor">
+      <a:schemeClr val="tx1"/>
+    </cs:fontRef>
+    <cs:spPr>
+      <a:ln w="19050" cap="rnd">
+        <a:solidFill>
+          <a:schemeClr val="phClr"/>
+        </a:solidFill>
+        <a:prstDash val="sysDot"/>
+      </a:ln>
+    </cs:spPr>
+  </cs:trendline>
+  <cs:trendlineLabel>
+    <cs:lnRef idx="0"/>
+    <cs:fillRef idx="0"/>
+    <cs:effectRef idx="0"/>
+    <cs:fontRef idx="minor">
+      <a:schemeClr val="tx1">
+        <a:lumMod val="65000"/>
+        <a:lumOff val="35000"/>
+      </a:schemeClr>
+    </cs:fontRef>
+    <cs:defRPr sz="900" kern="1200"/>
+  </cs:trendlineLabel>
+  <cs:upBar>
+    <cs:lnRef idx="0"/>
+    <cs:fillRef idx="0"/>
+    <cs:effectRef idx="0"/>
+    <cs:fontRef idx="minor">
+      <a:schemeClr val="tx1"/>
+    </cs:fontRef>
+    <cs:spPr>
+      <a:solidFill>
+        <a:schemeClr val="lt1"/>
+      </a:solidFill>
+      <a:ln w="9525" cap="flat" cmpd="sng" algn="ctr">
+        <a:solidFill>
+          <a:schemeClr val="tx1">
+            <a:lumMod val="65000"/>
+            <a:lumOff val="35000"/>
+          </a:schemeClr>
+        </a:solidFill>
+        <a:round/>
+      </a:ln>
+    </cs:spPr>
+  </cs:upBar>
+  <cs:valueAxis>
+    <cs:lnRef idx="0"/>
+    <cs:fillRef idx="0"/>
+    <cs:effectRef idx="0"/>
+    <cs:fontRef idx="minor">
+      <a:schemeClr val="tx1">
+        <a:lumMod val="65000"/>
+        <a:lumOff val="35000"/>
+      </a:schemeClr>
+    </cs:fontRef>
+    <cs:defRPr sz="900" kern="1200"/>
+  </cs:valueAxis>
+  <cs:wall>
+    <cs:lnRef idx="0"/>
+    <cs:fillRef idx="0"/>
+    <cs:effectRef idx="0"/>
+    <cs:fontRef idx="minor">
+      <a:schemeClr val="tx1"/>
+    </cs:fontRef>
+    <cs:spPr>
+      <a:noFill/>
+      <a:ln>
+        <a:noFill/>
+      </a:ln>
+    </cs:spPr>
+  </cs:wall>
+</cs:chartStyle>
+</file>
+
+<file path=ppt/notesMasters/notesMaster1.xml><?xml version="1.0" encoding="utf-8"?>
+<p:notesMaster xmlns:a="http://schemas.openxmlformats.org/drawingml/2006/main" xmlns:r="http://schemas.openxmlformats.org/officeDocument/2006/relationships" xmlns:p="http://schemas.openxmlformats.org/presentationml/2006/main">
+  <p:cSld>
+    <p:bg>
+      <p:bgRef idx="1001">
+        <a:schemeClr val="bg1"/>
+      </p:bgRef>
+    </p:bg>
+    <p:spTree>
+      <p:nvGrpSpPr>
+        <p:cNvPr id="1" name=""/>
+        <p:cNvGrpSpPr/>
+        <p:nvPr/>
+      </p:nvGrpSpPr>
+      <p:grpSpPr>
+        <a:xfrm>
+          <a:off x="0" y="0"/>
+          <a:ext cx="0" cy="0"/>
+          <a:chOff x="0" y="0"/>
+          <a:chExt cx="0" cy="0"/>
+        </a:xfrm>
+      </p:grpSpPr>
+      <p:sp>
+        <p:nvSpPr>
+          <p:cNvPr id="2" name="Header Placeholder 1"/>
+          <p:cNvSpPr>
+            <a:spLocks noGrp="1"/>
+          </p:cNvSpPr>
+          <p:nvPr>
+            <p:ph type="hdr" sz="quarter"/>
+          </p:nvPr>
+        </p:nvSpPr>
+        <p:spPr>
+          <a:xfrm>
+            <a:off x="0" y="0"/>
+            <a:ext cx="2971800" cy="458788"/>
+          </a:xfrm>
+          <a:prstGeom prst="rect">
+            <a:avLst/>
+          </a:prstGeom>
+        </p:spPr>
+        <p:txBody>
+          <a:bodyPr vert="horz" lIns="91440" tIns="45720" rIns="91440" bIns="45720" rtlCol="0"/>
+          <a:lstStyle>
+            <a:lvl1pPr algn="l">
+              <a:defRPr sz="1200"/>
+            </a:lvl1pPr>
+          </a:lstStyle>
+          <a:p>
+            <a:endParaRPr lang="en-ID"/>
+          </a:p>
+        </p:txBody>
+      </p:sp>
+      <p:sp>
+        <p:nvSpPr>
+          <p:cNvPr id="3" name="Date Placeholder 2"/>
+          <p:cNvSpPr>
+            <a:spLocks noGrp="1"/>
+          </p:cNvSpPr>
+          <p:nvPr>
+            <p:ph type="dt" idx="1"/>
+          </p:nvPr>
+        </p:nvSpPr>
+        <p:spPr>
+          <a:xfrm>
+            <a:off x="3884613" y="0"/>
+            <a:ext cx="2971800" cy="458788"/>
+          </a:xfrm>
+          <a:prstGeom prst="rect">
+            <a:avLst/>
+          </a:prstGeom>
+        </p:spPr>
+        <p:txBody>
+          <a:bodyPr vert="horz" lIns="91440" tIns="45720" rIns="91440" bIns="45720" rtlCol="0"/>
+          <a:lstStyle>
+            <a:lvl1pPr algn="r">
+              <a:defRPr sz="1200"/>
+            </a:lvl1pPr>
+          </a:lstStyle>
+          <a:p>
+            <a:fld id="{51583599-71B2-4673-8399-C03586A36A7B}" type="datetimeFigureOut">
+              <a:rPr lang="en-ID" smtClean="0"/>
+              <a:t>27/11/2020</a:t>
+            </a:fld>
+            <a:endParaRPr lang="en-ID"/>
+          </a:p>
+        </p:txBody>
+      </p:sp>
+      <p:sp>
+        <p:nvSpPr>
+          <p:cNvPr id="4" name="Slide Image Placeholder 3"/>
+          <p:cNvSpPr>
+            <a:spLocks noGrp="1" noRot="1" noChangeAspect="1"/>
+          </p:cNvSpPr>
+          <p:nvPr>
+            <p:ph type="sldImg" idx="2"/>
+          </p:nvPr>
+        </p:nvSpPr>
+        <p:spPr>
+          <a:xfrm>
+            <a:off x="685800" y="1143000"/>
+            <a:ext cx="5486400" cy="3086100"/>
+          </a:xfrm>
+          <a:prstGeom prst="rect">
+            <a:avLst/>
+          </a:prstGeom>
+          <a:noFill/>
+          <a:ln w="12700">
+            <a:solidFill>
+              <a:prstClr val="black"/>
+            </a:solidFill>
+          </a:ln>
+        </p:spPr>
+        <p:txBody>
+          <a:bodyPr vert="horz" lIns="91440" tIns="45720" rIns="91440" bIns="45720" rtlCol="0" anchor="ctr"/>
+          <a:lstStyle/>
+          <a:p>
+            <a:endParaRPr lang="en-ID"/>
+          </a:p>
+        </p:txBody>
+      </p:sp>
+      <p:sp>
+        <p:nvSpPr>
+          <p:cNvPr id="5" name="Notes Placeholder 4"/>
+          <p:cNvSpPr>
+            <a:spLocks noGrp="1"/>
+          </p:cNvSpPr>
+          <p:nvPr>
+            <p:ph type="body" sz="quarter" idx="3"/>
+          </p:nvPr>
+        </p:nvSpPr>
+        <p:spPr>
+          <a:xfrm>
+            <a:off x="685800" y="4400550"/>
+            <a:ext cx="5486400" cy="3600450"/>
+          </a:xfrm>
+          <a:prstGeom prst="rect">
+            <a:avLst/>
+          </a:prstGeom>
+        </p:spPr>
+        <p:txBody>
+          <a:bodyPr vert="horz" lIns="91440" tIns="45720" rIns="91440" bIns="45720" rtlCol="0"/>
+          <a:lstStyle/>
+          <a:p>
+            <a:pPr lvl="0"/>
+            <a:r>
+              <a:rPr lang="en-US"/>
+              <a:t>Click to edit Master text styles</a:t>
+            </a:r>
+          </a:p>
+          <a:p>
+            <a:pPr lvl="1"/>
+            <a:r>
+              <a:rPr lang="en-US"/>
+              <a:t>Second level</a:t>
+            </a:r>
+          </a:p>
+          <a:p>
+            <a:pPr lvl="2"/>
+            <a:r>
+              <a:rPr lang="en-US"/>
+              <a:t>Third level</a:t>
+            </a:r>
+          </a:p>
+          <a:p>
+            <a:pPr lvl="3"/>
+            <a:r>
+              <a:rPr lang="en-US"/>
+              <a:t>Fourth level</a:t>
+            </a:r>
+          </a:p>
+          <a:p>
+            <a:pPr lvl="4"/>
+            <a:r>
+              <a:rPr lang="en-US"/>
+              <a:t>Fifth level</a:t>
+            </a:r>
+            <a:endParaRPr lang="en-ID"/>
+          </a:p>
+        </p:txBody>
+      </p:sp>
+      <p:sp>
+        <p:nvSpPr>
+          <p:cNvPr id="6" name="Footer Placeholder 5"/>
+          <p:cNvSpPr>
+            <a:spLocks noGrp="1"/>
+          </p:cNvSpPr>
+          <p:nvPr>
+            <p:ph type="ftr" sz="quarter" idx="4"/>
+          </p:nvPr>
+        </p:nvSpPr>
+        <p:spPr>
+          <a:xfrm>
+            <a:off x="0" y="8685213"/>
+            <a:ext cx="2971800" cy="458787"/>
+          </a:xfrm>
+          <a:prstGeom prst="rect">
+            <a:avLst/>
+          </a:prstGeom>
+        </p:spPr>
+        <p:txBody>
+          <a:bodyPr vert="horz" lIns="91440" tIns="45720" rIns="91440" bIns="45720" rtlCol="0" anchor="b"/>
+          <a:lstStyle>
+            <a:lvl1pPr algn="l">
+              <a:defRPr sz="1200"/>
+            </a:lvl1pPr>
+          </a:lstStyle>
+          <a:p>
+            <a:endParaRPr lang="en-ID"/>
+          </a:p>
+        </p:txBody>
+      </p:sp>
+      <p:sp>
+        <p:nvSpPr>
+          <p:cNvPr id="7" name="Slide Number Placeholder 6"/>
+          <p:cNvSpPr>
+            <a:spLocks noGrp="1"/>
+          </p:cNvSpPr>
+          <p:nvPr>
+            <p:ph type="sldNum" sz="quarter" idx="5"/>
+          </p:nvPr>
+        </p:nvSpPr>
+        <p:spPr>
+          <a:xfrm>
+            <a:off x="3884613" y="8685213"/>
+            <a:ext cx="2971800" cy="458787"/>
+          </a:xfrm>
+          <a:prstGeom prst="rect">
+            <a:avLst/>
+          </a:prstGeom>
+        </p:spPr>
+        <p:txBody>
+          <a:bodyPr vert="horz" lIns="91440" tIns="45720" rIns="91440" bIns="45720" rtlCol="0" anchor="b"/>
+          <a:lstStyle>
+            <a:lvl1pPr algn="r">
+              <a:defRPr sz="1200"/>
+            </a:lvl1pPr>
+          </a:lstStyle>
+          <a:p>
+            <a:fld id="{0B3924E7-3729-40D5-995F-270D5172E8A0}" type="slidenum">
+              <a:rPr lang="en-ID" smtClean="0"/>
+              <a:t>‹#›</a:t>
+            </a:fld>
+            <a:endParaRPr lang="en-ID"/>
+          </a:p>
+        </p:txBody>
+      </p:sp>
+    </p:spTree>
+    <p:extLst>
+      <p:ext uri="{BB962C8B-B14F-4D97-AF65-F5344CB8AC3E}">
+        <p14:creationId xmlns:p14="http://schemas.microsoft.com/office/powerpoint/2010/main" val="4050891656"/>
+      </p:ext>
+    </p:extLst>
+  </p:cSld>
+  <p:clrMap bg1="lt1" tx1="dk1" bg2="lt2" tx2="dk2" accent1="accent1" accent2="accent2" accent3="accent3" accent4="accent4" accent5="accent5" accent6="accent6" hlink="hlink" folHlink="folHlink"/>
+  <p:notesStyle>
+    <a:lvl1pPr marL="0" algn="l" defTabSz="914400" rtl="0" eaLnBrk="1" latinLnBrk="0" hangingPunct="1">
+      <a:defRPr sz="1200" kern="1200">
+        <a:solidFill>
+          <a:schemeClr val="tx1"/>
+        </a:solidFill>
+        <a:latin typeface="+mn-lt"/>
+        <a:ea typeface="+mn-ea"/>
+        <a:cs typeface="+mn-cs"/>
+      </a:defRPr>
+    </a:lvl1pPr>
+    <a:lvl2pPr marL="457200" algn="l" defTabSz="914400" rtl="0" eaLnBrk="1" latinLnBrk="0" hangingPunct="1">
+      <a:defRPr sz="1200" kern="1200">
+        <a:solidFill>
+          <a:schemeClr val="tx1"/>
+        </a:solidFill>
+        <a:latin typeface="+mn-lt"/>
+        <a:ea typeface="+mn-ea"/>
+        <a:cs typeface="+mn-cs"/>
+      </a:defRPr>
+    </a:lvl2pPr>
+    <a:lvl3pPr marL="914400" algn="l" defTabSz="914400" rtl="0" eaLnBrk="1" latinLnBrk="0" hangingPunct="1">
+      <a:defRPr sz="1200" kern="1200">
+        <a:solidFill>
+          <a:schemeClr val="tx1"/>
+        </a:solidFill>
+        <a:latin typeface="+mn-lt"/>
+        <a:ea typeface="+mn-ea"/>
+        <a:cs typeface="+mn-cs"/>
+      </a:defRPr>
+    </a:lvl3pPr>
+    <a:lvl4pPr marL="1371600" algn="l" defTabSz="914400" rtl="0" eaLnBrk="1" latinLnBrk="0" hangingPunct="1">
+      <a:defRPr sz="1200" kern="1200">
+        <a:solidFill>
+          <a:schemeClr val="tx1"/>
+        </a:solidFill>
+        <a:latin typeface="+mn-lt"/>
+        <a:ea typeface="+mn-ea"/>
+        <a:cs typeface="+mn-cs"/>
+      </a:defRPr>
+    </a:lvl4pPr>
+    <a:lvl5pPr marL="1828800" algn="l" defTabSz="914400" rtl="0" eaLnBrk="1" latinLnBrk="0" hangingPunct="1">
+      <a:defRPr sz="1200" kern="1200">
+        <a:solidFill>
+          <a:schemeClr val="tx1"/>
+        </a:solidFill>
+        <a:latin typeface="+mn-lt"/>
+        <a:ea typeface="+mn-ea"/>
+        <a:cs typeface="+mn-cs"/>
+      </a:defRPr>
+    </a:lvl5pPr>
+    <a:lvl6pPr marL="2286000" algn="l" defTabSz="914400" rtl="0" eaLnBrk="1" latinLnBrk="0" hangingPunct="1">
+      <a:defRPr sz="1200" kern="1200">
+        <a:solidFill>
+          <a:schemeClr val="tx1"/>
+        </a:solidFill>
+        <a:latin typeface="+mn-lt"/>
+        <a:ea typeface="+mn-ea"/>
+        <a:cs typeface="+mn-cs"/>
+      </a:defRPr>
+    </a:lvl6pPr>
+    <a:lvl7pPr marL="2743200" algn="l" defTabSz="914400" rtl="0" eaLnBrk="1" latinLnBrk="0" hangingPunct="1">
+      <a:defRPr sz="1200" kern="1200">
+        <a:solidFill>
+          <a:schemeClr val="tx1"/>
+        </a:solidFill>
+        <a:latin typeface="+mn-lt"/>
+        <a:ea typeface="+mn-ea"/>
+        <a:cs typeface="+mn-cs"/>
+      </a:defRPr>
+    </a:lvl7pPr>
+    <a:lvl8pPr marL="3200400" algn="l" defTabSz="914400" rtl="0" eaLnBrk="1" latinLnBrk="0" hangingPunct="1">
+      <a:defRPr sz="1200" kern="1200">
+        <a:solidFill>
+          <a:schemeClr val="tx1"/>
+        </a:solidFill>
+        <a:latin typeface="+mn-lt"/>
+        <a:ea typeface="+mn-ea"/>
+        <a:cs typeface="+mn-cs"/>
+      </a:defRPr>
+    </a:lvl8pPr>
+    <a:lvl9pPr marL="3657600" algn="l" defTabSz="914400" rtl="0" eaLnBrk="1" latinLnBrk="0" hangingPunct="1">
+      <a:defRPr sz="1200" kern="1200">
+        <a:solidFill>
+          <a:schemeClr val="tx1"/>
+        </a:solidFill>
+        <a:latin typeface="+mn-lt"/>
+        <a:ea typeface="+mn-ea"/>
+        <a:cs typeface="+mn-cs"/>
+      </a:defRPr>
+    </a:lvl9pPr>
+  </p:notesStyle>
+</p:notesMaster>
+</file>
+
+<file path=ppt/notesSlides/notesSlide1.xml><?xml version="1.0" encoding="utf-8"?>
+<p:notes xmlns:a="http://schemas.openxmlformats.org/drawingml/2006/main" xmlns:r="http://schemas.openxmlformats.org/officeDocument/2006/relationships" xmlns:p="http://schemas.openxmlformats.org/presentationml/2006/main">
+  <p:cSld>
+    <p:spTree>
+      <p:nvGrpSpPr>
+        <p:cNvPr id="1" name=""/>
+        <p:cNvGrpSpPr/>
+        <p:nvPr/>
+      </p:nvGrpSpPr>
+      <p:grpSpPr>
+        <a:xfrm>
+          <a:off x="0" y="0"/>
+          <a:ext cx="0" cy="0"/>
+          <a:chOff x="0" y="0"/>
+          <a:chExt cx="0" cy="0"/>
+        </a:xfrm>
+      </p:grpSpPr>
+      <p:sp>
+        <p:nvSpPr>
+          <p:cNvPr id="2" name="Slide Image Placeholder 1"/>
+          <p:cNvSpPr>
+            <a:spLocks noGrp="1" noRot="1" noChangeAspect="1"/>
+          </p:cNvSpPr>
+          <p:nvPr>
+            <p:ph type="sldImg"/>
+          </p:nvPr>
+        </p:nvSpPr>
+        <p:spPr/>
+      </p:sp>
+      <p:sp>
+        <p:nvSpPr>
+          <p:cNvPr id="3" name="Notes Placeholder 2"/>
+          <p:cNvSpPr>
+            <a:spLocks noGrp="1"/>
+          </p:cNvSpPr>
+          <p:nvPr>
+            <p:ph type="body" idx="1"/>
+          </p:nvPr>
+        </p:nvSpPr>
+        <p:spPr/>
+        <p:txBody>
+          <a:bodyPr/>
+          <a:lstStyle/>
+          <a:p>
+            <a:endParaRPr lang="en-ID" dirty="0"/>
+          </a:p>
+        </p:txBody>
+      </p:sp>
+      <p:sp>
+        <p:nvSpPr>
+          <p:cNvPr id="4" name="Slide Number Placeholder 3"/>
+          <p:cNvSpPr>
+            <a:spLocks noGrp="1"/>
+          </p:cNvSpPr>
+          <p:nvPr>
+            <p:ph type="sldNum" sz="quarter" idx="5"/>
+          </p:nvPr>
+        </p:nvSpPr>
+        <p:spPr/>
+        <p:txBody>
+          <a:bodyPr/>
+          <a:lstStyle/>
+          <a:p>
+            <a:fld id="{0B3924E7-3729-40D5-995F-270D5172E8A0}" type="slidenum">
+              <a:rPr lang="en-ID" smtClean="0"/>
+              <a:t>4</a:t>
+            </a:fld>
+            <a:endParaRPr lang="en-ID"/>
+          </a:p>
+        </p:txBody>
+      </p:sp>
+    </p:spTree>
+    <p:extLst>
+      <p:ext uri="{BB962C8B-B14F-4D97-AF65-F5344CB8AC3E}">
+        <p14:creationId xmlns:p14="http://schemas.microsoft.com/office/powerpoint/2010/main" val="1744832590"/>
+      </p:ext>
+    </p:extLst>
+  </p:cSld>
+  <p:clrMapOvr>
+    <a:masterClrMapping/>
+  </p:clrMapOvr>
+</p:notes>
 </file>
 
 <file path=ppt/slideLayouts/slideLayout1.xml><?xml version="1.0" encoding="utf-8"?>
@@ -259,7 +1922,7 @@
           <a:p>
             <a:fld id="{395620BC-8BFB-4C25-88C4-E68B9687E50E}" type="datetimeFigureOut">
               <a:rPr lang="en-ID" smtClean="0"/>
-              <a:t>23/11/2020</a:t>
+              <a:t>27/11/2020</a:t>
             </a:fld>
             <a:endParaRPr lang="en-ID"/>
           </a:p>
@@ -459,7 +2122,7 @@
           <a:p>
             <a:fld id="{395620BC-8BFB-4C25-88C4-E68B9687E50E}" type="datetimeFigureOut">
               <a:rPr lang="en-ID" smtClean="0"/>
-              <a:t>23/11/2020</a:t>
+              <a:t>27/11/2020</a:t>
             </a:fld>
             <a:endParaRPr lang="en-ID"/>
           </a:p>
@@ -669,7 +2332,7 @@
           <a:p>
             <a:fld id="{395620BC-8BFB-4C25-88C4-E68B9687E50E}" type="datetimeFigureOut">
               <a:rPr lang="en-ID" smtClean="0"/>
-              <a:t>23/11/2020</a:t>
+              <a:t>27/11/2020</a:t>
             </a:fld>
             <a:endParaRPr lang="en-ID"/>
           </a:p>
@@ -869,7 +2532,7 @@
           <a:p>
             <a:fld id="{395620BC-8BFB-4C25-88C4-E68B9687E50E}" type="datetimeFigureOut">
               <a:rPr lang="en-ID" smtClean="0"/>
-              <a:t>23/11/2020</a:t>
+              <a:t>27/11/2020</a:t>
             </a:fld>
             <a:endParaRPr lang="en-ID"/>
           </a:p>
@@ -1145,7 +2808,7 @@
           <a:p>
             <a:fld id="{395620BC-8BFB-4C25-88C4-E68B9687E50E}" type="datetimeFigureOut">
               <a:rPr lang="en-ID" smtClean="0"/>
-              <a:t>23/11/2020</a:t>
+              <a:t>27/11/2020</a:t>
             </a:fld>
             <a:endParaRPr lang="en-ID"/>
           </a:p>
@@ -1413,7 +3076,7 @@
           <a:p>
             <a:fld id="{395620BC-8BFB-4C25-88C4-E68B9687E50E}" type="datetimeFigureOut">
               <a:rPr lang="en-ID" smtClean="0"/>
-              <a:t>23/11/2020</a:t>
+              <a:t>27/11/2020</a:t>
             </a:fld>
             <a:endParaRPr lang="en-ID"/>
           </a:p>
@@ -1828,7 +3491,7 @@
           <a:p>
             <a:fld id="{395620BC-8BFB-4C25-88C4-E68B9687E50E}" type="datetimeFigureOut">
               <a:rPr lang="en-ID" smtClean="0"/>
-              <a:t>23/11/2020</a:t>
+              <a:t>27/11/2020</a:t>
             </a:fld>
             <a:endParaRPr lang="en-ID"/>
           </a:p>
@@ -1970,7 +3633,7 @@
           <a:p>
             <a:fld id="{395620BC-8BFB-4C25-88C4-E68B9687E50E}" type="datetimeFigureOut">
               <a:rPr lang="en-ID" smtClean="0"/>
-              <a:t>23/11/2020</a:t>
+              <a:t>27/11/2020</a:t>
             </a:fld>
             <a:endParaRPr lang="en-ID"/>
           </a:p>
@@ -2083,7 +3746,7 @@
           <a:p>
             <a:fld id="{395620BC-8BFB-4C25-88C4-E68B9687E50E}" type="datetimeFigureOut">
               <a:rPr lang="en-ID" smtClean="0"/>
-              <a:t>23/11/2020</a:t>
+              <a:t>27/11/2020</a:t>
             </a:fld>
             <a:endParaRPr lang="en-ID"/>
           </a:p>
@@ -2396,7 +4059,7 @@
           <a:p>
             <a:fld id="{395620BC-8BFB-4C25-88C4-E68B9687E50E}" type="datetimeFigureOut">
               <a:rPr lang="en-ID" smtClean="0"/>
-              <a:t>23/11/2020</a:t>
+              <a:t>27/11/2020</a:t>
             </a:fld>
             <a:endParaRPr lang="en-ID"/>
           </a:p>
@@ -2685,7 +4348,7 @@
           <a:p>
             <a:fld id="{395620BC-8BFB-4C25-88C4-E68B9687E50E}" type="datetimeFigureOut">
               <a:rPr lang="en-ID" smtClean="0"/>
-              <a:t>23/11/2020</a:t>
+              <a:t>27/11/2020</a:t>
             </a:fld>
             <a:endParaRPr lang="en-ID"/>
           </a:p>
@@ -2928,7 +4591,7 @@
           <a:p>
             <a:fld id="{395620BC-8BFB-4C25-88C4-E68B9687E50E}" type="datetimeFigureOut">
               <a:rPr lang="en-ID" smtClean="0"/>
-              <a:t>23/11/2020</a:t>
+              <a:t>27/11/2020</a:t>
             </a:fld>
             <a:endParaRPr lang="en-ID"/>
           </a:p>
@@ -3347,379 +5010,6 @@
       </p:grpSpPr>
       <p:sp>
         <p:nvSpPr>
-          <p:cNvPr id="4" name="Arrow: Pentagon 3">
-            <a:extLst>
-              <a:ext uri="{FF2B5EF4-FFF2-40B4-BE49-F238E27FC236}">
-                <a16:creationId xmlns:a16="http://schemas.microsoft.com/office/drawing/2014/main" id="{DF18E988-E974-4B32-9D45-2CF80AAC9AAA}"/>
-              </a:ext>
-            </a:extLst>
-          </p:cNvPr>
-          <p:cNvSpPr/>
-          <p:nvPr/>
-        </p:nvSpPr>
-        <p:spPr>
-          <a:xfrm flipH="1">
-            <a:off x="10548995" y="62690"/>
-            <a:ext cx="1643004" cy="464234"/>
-          </a:xfrm>
-          <a:prstGeom prst="homePlate">
-            <a:avLst/>
-          </a:prstGeom>
-          <a:solidFill>
-            <a:schemeClr val="tx1"/>
-          </a:solidFill>
-          <a:ln>
-            <a:noFill/>
-          </a:ln>
-        </p:spPr>
-        <p:style>
-          <a:lnRef idx="2">
-            <a:schemeClr val="accent1">
-              <a:shade val="50000"/>
-            </a:schemeClr>
-          </a:lnRef>
-          <a:fillRef idx="1">
-            <a:schemeClr val="accent1"/>
-          </a:fillRef>
-          <a:effectRef idx="0">
-            <a:schemeClr val="accent1"/>
-          </a:effectRef>
-          <a:fontRef idx="minor">
-            <a:schemeClr val="lt1"/>
-          </a:fontRef>
-        </p:style>
-        <p:txBody>
-          <a:bodyPr rtlCol="0" anchor="ctr"/>
-          <a:lstStyle/>
-          <a:p>
-            <a:pPr algn="ctr"/>
-            <a:endParaRPr lang="en-ID" sz="3600" dirty="0"/>
-          </a:p>
-        </p:txBody>
-      </p:sp>
-      <p:grpSp>
-        <p:nvGrpSpPr>
-          <p:cNvPr id="5" name="Group 4">
-            <a:extLst>
-              <a:ext uri="{FF2B5EF4-FFF2-40B4-BE49-F238E27FC236}">
-                <a16:creationId xmlns:a16="http://schemas.microsoft.com/office/drawing/2014/main" id="{D932FF59-8DB9-4F61-8C2C-B5AFC6F4E215}"/>
-              </a:ext>
-            </a:extLst>
-          </p:cNvPr>
-          <p:cNvGrpSpPr/>
-          <p:nvPr/>
-        </p:nvGrpSpPr>
-        <p:grpSpPr>
-          <a:xfrm>
-            <a:off x="0" y="62690"/>
-            <a:ext cx="10705514" cy="464235"/>
-            <a:chOff x="0" y="239152"/>
-            <a:chExt cx="11690252" cy="464235"/>
-          </a:xfrm>
-          <a:gradFill flip="none" rotWithShape="1">
-            <a:gsLst>
-              <a:gs pos="39000">
-                <a:srgbClr val="88686C"/>
-              </a:gs>
-              <a:gs pos="1000">
-                <a:schemeClr val="accent2">
-                  <a:lumMod val="75000"/>
-                </a:schemeClr>
-              </a:gs>
-              <a:gs pos="49000">
-                <a:schemeClr val="accent1">
-                  <a:lumMod val="97000"/>
-                  <a:lumOff val="3000"/>
-                </a:schemeClr>
-              </a:gs>
-              <a:gs pos="100000">
-                <a:srgbClr val="002060"/>
-              </a:gs>
-            </a:gsLst>
-            <a:path path="circle">
-              <a:fillToRect l="100000" t="100000"/>
-            </a:path>
-            <a:tileRect r="-100000" b="-100000"/>
-          </a:gradFill>
-        </p:grpSpPr>
-        <p:sp>
-          <p:nvSpPr>
-            <p:cNvPr id="6" name="Arrow: Chevron 5">
-              <a:extLst>
-                <a:ext uri="{FF2B5EF4-FFF2-40B4-BE49-F238E27FC236}">
-                  <a16:creationId xmlns:a16="http://schemas.microsoft.com/office/drawing/2014/main" id="{D8B70A1D-2C47-4D21-B04E-9BD7B2CC9F0C}"/>
-                </a:ext>
-              </a:extLst>
-            </p:cNvPr>
-            <p:cNvSpPr/>
-            <p:nvPr/>
-          </p:nvSpPr>
-          <p:spPr>
-            <a:xfrm flipH="1">
-              <a:off x="647114" y="239153"/>
-              <a:ext cx="11043138" cy="464234"/>
-            </a:xfrm>
-            <a:prstGeom prst="chevron">
-              <a:avLst/>
-            </a:prstGeom>
-            <a:grpFill/>
-            <a:ln>
-              <a:noFill/>
-            </a:ln>
-          </p:spPr>
-          <p:style>
-            <a:lnRef idx="2">
-              <a:schemeClr val="accent1">
-                <a:shade val="50000"/>
-              </a:schemeClr>
-            </a:lnRef>
-            <a:fillRef idx="1">
-              <a:schemeClr val="accent1"/>
-            </a:fillRef>
-            <a:effectRef idx="0">
-              <a:schemeClr val="accent1"/>
-            </a:effectRef>
-            <a:fontRef idx="minor">
-              <a:schemeClr val="lt1"/>
-            </a:fontRef>
-          </p:style>
-          <p:txBody>
-            <a:bodyPr rtlCol="0" anchor="ctr"/>
-            <a:lstStyle/>
-            <a:p>
-              <a:pPr algn="r"/>
-              <a:r>
-                <a:rPr lang="en-ID" sz="3600" b="1" dirty="0">
-                  <a:solidFill>
-                    <a:schemeClr val="bg1"/>
-                  </a:solidFill>
-                </a:rPr>
-                <a:t>Profile</a:t>
-              </a:r>
-            </a:p>
-          </p:txBody>
-        </p:sp>
-        <p:sp>
-          <p:nvSpPr>
-            <p:cNvPr id="7" name="Arrow: Pentagon 6">
-              <a:extLst>
-                <a:ext uri="{FF2B5EF4-FFF2-40B4-BE49-F238E27FC236}">
-                  <a16:creationId xmlns:a16="http://schemas.microsoft.com/office/drawing/2014/main" id="{C671DB4D-14BB-4825-9323-3CB6A6FDCF56}"/>
-                </a:ext>
-              </a:extLst>
-            </p:cNvPr>
-            <p:cNvSpPr/>
-            <p:nvPr/>
-          </p:nvSpPr>
-          <p:spPr>
-            <a:xfrm>
-              <a:off x="0" y="239152"/>
-              <a:ext cx="1350495" cy="464234"/>
-            </a:xfrm>
-            <a:prstGeom prst="homePlate">
-              <a:avLst/>
-            </a:prstGeom>
-            <a:grpFill/>
-            <a:ln>
-              <a:noFill/>
-            </a:ln>
-          </p:spPr>
-          <p:style>
-            <a:lnRef idx="2">
-              <a:schemeClr val="accent1">
-                <a:shade val="50000"/>
-              </a:schemeClr>
-            </a:lnRef>
-            <a:fillRef idx="1">
-              <a:schemeClr val="accent1"/>
-            </a:fillRef>
-            <a:effectRef idx="0">
-              <a:schemeClr val="accent1"/>
-            </a:effectRef>
-            <a:fontRef idx="minor">
-              <a:schemeClr val="lt1"/>
-            </a:fontRef>
-          </p:style>
-          <p:txBody>
-            <a:bodyPr rtlCol="0" anchor="ctr"/>
-            <a:lstStyle/>
-            <a:p>
-              <a:pPr algn="r"/>
-              <a:endParaRPr lang="en-ID" sz="3600" b="1">
-                <a:solidFill>
-                  <a:schemeClr val="bg1"/>
-                </a:solidFill>
-              </a:endParaRPr>
-            </a:p>
-          </p:txBody>
-        </p:sp>
-      </p:grpSp>
-      <p:sp>
-        <p:nvSpPr>
-          <p:cNvPr id="8" name="TextBox 7">
-            <a:extLst>
-              <a:ext uri="{FF2B5EF4-FFF2-40B4-BE49-F238E27FC236}">
-                <a16:creationId xmlns:a16="http://schemas.microsoft.com/office/drawing/2014/main" id="{3A5FDC17-91DE-4953-98BC-7FF5345B93B1}"/>
-              </a:ext>
-            </a:extLst>
-          </p:cNvPr>
-          <p:cNvSpPr txBox="1"/>
-          <p:nvPr/>
-        </p:nvSpPr>
-        <p:spPr>
-          <a:xfrm>
-            <a:off x="53117" y="100285"/>
-            <a:ext cx="6042883" cy="461665"/>
-          </a:xfrm>
-          <a:prstGeom prst="rect">
-            <a:avLst/>
-          </a:prstGeom>
-          <a:noFill/>
-        </p:spPr>
-        <p:txBody>
-          <a:bodyPr wrap="square" rtlCol="0">
-            <a:spAutoFit/>
-          </a:bodyPr>
-          <a:lstStyle/>
-          <a:p>
-            <a:r>
-              <a:rPr lang="en-ID" sz="2400" dirty="0" err="1">
-                <a:solidFill>
-                  <a:schemeClr val="bg1"/>
-                </a:solidFill>
-              </a:rPr>
-              <a:t>Profil</a:t>
-            </a:r>
-            <a:r>
-              <a:rPr lang="en-ID" sz="2400" dirty="0">
-                <a:solidFill>
-                  <a:schemeClr val="bg1"/>
-                </a:solidFill>
-              </a:rPr>
-              <a:t> Tim </a:t>
-            </a:r>
-            <a:r>
-              <a:rPr lang="en-ID" sz="2400" dirty="0" err="1">
-                <a:solidFill>
-                  <a:schemeClr val="bg1"/>
-                </a:solidFill>
-              </a:rPr>
-              <a:t>Laros</a:t>
-            </a:r>
-            <a:endParaRPr lang="en-ID" sz="2400" dirty="0">
-              <a:solidFill>
-                <a:schemeClr val="bg1"/>
-              </a:solidFill>
-            </a:endParaRPr>
-          </a:p>
-        </p:txBody>
-      </p:sp>
-      <p:pic>
-        <p:nvPicPr>
-          <p:cNvPr id="9" name="Picture 8">
-            <a:extLst>
-              <a:ext uri="{FF2B5EF4-FFF2-40B4-BE49-F238E27FC236}">
-                <a16:creationId xmlns:a16="http://schemas.microsoft.com/office/drawing/2014/main" id="{E77AC275-335D-4D1F-B5AA-44C6C78C8B97}"/>
-              </a:ext>
-            </a:extLst>
-          </p:cNvPr>
-          <p:cNvPicPr>
-            <a:picLocks noChangeAspect="1"/>
-          </p:cNvPicPr>
-          <p:nvPr/>
-        </p:nvPicPr>
-        <p:blipFill rotWithShape="1">
-          <a:blip r:embed="rId2">
-            <a:extLst>
-              <a:ext uri="{BEBA8EAE-BF5A-486C-A8C5-ECC9F3942E4B}">
-                <a14:imgProps xmlns:a14="http://schemas.microsoft.com/office/drawing/2010/main">
-                  <a14:imgLayer r:embed="rId3">
-                    <a14:imgEffect>
-                      <a14:colorTemperature colorTemp="6501"/>
-                    </a14:imgEffect>
-                    <a14:imgEffect>
-                      <a14:brightnessContrast bright="40000" contrast="-40000"/>
-                    </a14:imgEffect>
-                  </a14:imgLayer>
-                </a14:imgProps>
-              </a:ext>
-              <a:ext uri="{28A0092B-C50C-407E-A947-70E740481C1C}">
-                <a14:useLocalDpi xmlns:a14="http://schemas.microsoft.com/office/drawing/2010/main" val="0"/>
-              </a:ext>
-            </a:extLst>
-          </a:blip>
-          <a:srcRect l="42097" t="22173" r="4293" b="34664"/>
-          <a:stretch/>
-        </p:blipFill>
-        <p:spPr>
-          <a:xfrm>
-            <a:off x="9369083" y="858129"/>
-            <a:ext cx="1991155" cy="2617425"/>
-          </a:xfrm>
-          <a:prstGeom prst="rect">
-            <a:avLst/>
-          </a:prstGeom>
-        </p:spPr>
-      </p:pic>
-      <p:sp>
-        <p:nvSpPr>
-          <p:cNvPr id="13" name="TextBox 12">
-            <a:extLst>
-              <a:ext uri="{FF2B5EF4-FFF2-40B4-BE49-F238E27FC236}">
-                <a16:creationId xmlns:a16="http://schemas.microsoft.com/office/drawing/2014/main" id="{69DF78E8-F761-424B-9596-7D56DB3F61D8}"/>
-              </a:ext>
-            </a:extLst>
-          </p:cNvPr>
-          <p:cNvSpPr txBox="1"/>
-          <p:nvPr/>
-        </p:nvSpPr>
-        <p:spPr>
-          <a:xfrm>
-            <a:off x="7916882" y="1843675"/>
-            <a:ext cx="2447778" cy="646331"/>
-          </a:xfrm>
-          <a:prstGeom prst="rect">
-            <a:avLst/>
-          </a:prstGeom>
-          <a:noFill/>
-        </p:spPr>
-        <p:txBody>
-          <a:bodyPr wrap="square" rtlCol="0">
-            <a:spAutoFit/>
-          </a:bodyPr>
-          <a:lstStyle/>
-          <a:p>
-            <a:r>
-              <a:rPr lang="en-ID" u="sng" dirty="0">
-                <a:effectLst>
-                  <a:outerShdw blurRad="50800" dist="38100" algn="l" rotWithShape="0">
-                    <a:prstClr val="black">
-                      <a:alpha val="40000"/>
-                    </a:prstClr>
-                  </a:outerShdw>
-                </a:effectLst>
-              </a:rPr>
-              <a:t>Eka Wahana Putra</a:t>
-            </a:r>
-          </a:p>
-          <a:p>
-            <a:r>
-              <a:rPr lang="en-ID" b="1" dirty="0">
-                <a:effectLst>
-                  <a:outerShdw blurRad="50800" dist="38100" algn="l" rotWithShape="0">
-                    <a:prstClr val="black">
-                      <a:alpha val="40000"/>
-                    </a:prstClr>
-                  </a:outerShdw>
-                </a:effectLst>
-              </a:rPr>
-              <a:t>KETUA</a:t>
-            </a:r>
-          </a:p>
-        </p:txBody>
-      </p:sp>
-      <p:sp>
-        <p:nvSpPr>
           <p:cNvPr id="14" name="TextBox 13">
             <a:extLst>
               <a:ext uri="{FF2B5EF4-FFF2-40B4-BE49-F238E27FC236}">
@@ -3732,7 +5022,7 @@
         </p:nvSpPr>
         <p:spPr>
           <a:xfrm>
-            <a:off x="611942" y="1532495"/>
+            <a:off x="400926" y="2228671"/>
             <a:ext cx="6541482" cy="2400657"/>
           </a:xfrm>
           <a:prstGeom prst="rect">
@@ -9582,7 +10872,7 @@
                   <a:schemeClr val="bg1"/>
                 </a:solidFill>
               </a:rPr>
-              <a:t>Breakdown Problem by KPI OC</a:t>
+              <a:t>KPI Problem Anal</a:t>
             </a:r>
           </a:p>
         </p:txBody>
@@ -9602,14 +10892,14 @@
           <p:nvPr>
             <p:extLst>
               <p:ext uri="{D42A27DB-BD31-4B8C-83A1-F6EECF244321}">
-                <p14:modId xmlns:p14="http://schemas.microsoft.com/office/powerpoint/2010/main" val="3487174409"/>
+                <p14:modId xmlns:p14="http://schemas.microsoft.com/office/powerpoint/2010/main" val="175020302"/>
               </p:ext>
             </p:extLst>
           </p:nvPr>
         </p:nvGraphicFramePr>
         <p:xfrm>
           <a:off x="106930" y="914397"/>
-          <a:ext cx="3058301" cy="5363893"/>
+          <a:ext cx="3058301" cy="5739621"/>
         </p:xfrm>
         <a:graphic>
           <a:graphicData uri="http://schemas.openxmlformats.org/drawingml/2006/table">
@@ -9647,7 +10937,7 @@
                   </a:extLst>
                 </a:gridCol>
               </a:tblGrid>
-              <a:tr h="444137">
+              <a:tr h="488367">
                 <a:tc>
                   <a:txBody>
                     <a:bodyPr/>
@@ -9766,7 +11056,7 @@
                   </a:ext>
                 </a:extLst>
               </a:tr>
-              <a:tr h="392100">
+              <a:tr h="431147">
                 <a:tc>
                   <a:txBody>
                     <a:bodyPr/>
@@ -9868,7 +11158,7 @@
                   </a:ext>
                 </a:extLst>
               </a:tr>
-              <a:tr h="282632">
+              <a:tr h="310778">
                 <a:tc>
                   <a:txBody>
                     <a:bodyPr/>
@@ -9891,7 +11181,7 @@
                       <a:pPr algn="ctr"/>
                       <a:r>
                         <a:rPr lang="en-ID" sz="1100" dirty="0"/>
-                        <a:t>0,4%</a:t>
+                        <a:t>43</a:t>
                       </a:r>
                     </a:p>
                   </a:txBody>
@@ -9913,7 +11203,10 @@
                     <a:lstStyle/>
                     <a:p>
                       <a:pPr algn="ctr"/>
-                      <a:endParaRPr lang="en-ID" sz="1100" dirty="0"/>
+                      <a:r>
+                        <a:rPr lang="en-ID" sz="1100" dirty="0"/>
+                        <a:t>50</a:t>
+                      </a:r>
                     </a:p>
                   </a:txBody>
                   <a:tcPr anchor="ctr">
@@ -9943,7 +11236,10 @@
                     <a:lstStyle/>
                     <a:p>
                       <a:pPr algn="ctr"/>
-                      <a:endParaRPr lang="en-ID" sz="1100" dirty="0"/>
+                      <a:r>
+                        <a:rPr lang="en-ID" sz="1100" dirty="0"/>
+                        <a:t>116%</a:t>
+                      </a:r>
                     </a:p>
                   </a:txBody>
                   <a:tcPr anchor="ctr">
@@ -9964,7 +11260,7 @@
                   </a:ext>
                 </a:extLst>
               </a:tr>
-              <a:tr h="282632">
+              <a:tr h="310778">
                 <a:tc>
                   <a:txBody>
                     <a:bodyPr/>
@@ -10013,7 +11309,10 @@
                     <a:lstStyle/>
                     <a:p>
                       <a:pPr algn="ctr"/>
-                      <a:endParaRPr lang="en-ID" sz="1100" dirty="0"/>
+                      <a:r>
+                        <a:rPr lang="en-ID" sz="1100" dirty="0"/>
+                        <a:t>98%</a:t>
+                      </a:r>
                     </a:p>
                   </a:txBody>
                   <a:tcPr anchor="ctr">
@@ -10043,7 +11342,10 @@
                     <a:lstStyle/>
                     <a:p>
                       <a:pPr algn="ctr"/>
-                      <a:endParaRPr lang="en-ID" sz="1100" dirty="0"/>
+                      <a:r>
+                        <a:rPr lang="en-ID" sz="1100" dirty="0"/>
+                        <a:t>101%</a:t>
+                      </a:r>
                     </a:p>
                   </a:txBody>
                   <a:tcPr anchor="ctr">
@@ -10064,7 +11366,7 @@
                   </a:ext>
                 </a:extLst>
               </a:tr>
-              <a:tr h="282632">
+              <a:tr h="310778">
                 <a:tc>
                   <a:txBody>
                     <a:bodyPr/>
@@ -10166,7 +11468,7 @@
                   </a:ext>
                 </a:extLst>
               </a:tr>
-              <a:tr h="282632">
+              <a:tr h="310778">
                 <a:tc>
                   <a:txBody>
                     <a:bodyPr/>
@@ -10216,7 +11518,10 @@
                     <a:lstStyle/>
                     <a:p>
                       <a:pPr algn="ctr"/>
-                      <a:endParaRPr lang="en-ID" sz="1100" dirty="0"/>
+                      <a:r>
+                        <a:rPr lang="en-ID" sz="1100" dirty="0"/>
+                        <a:t>70%</a:t>
+                      </a:r>
                     </a:p>
                   </a:txBody>
                   <a:tcPr anchor="ctr">
@@ -10246,7 +11551,10 @@
                     <a:lstStyle/>
                     <a:p>
                       <a:pPr algn="ctr"/>
-                      <a:endParaRPr lang="en-ID" sz="1100" dirty="0"/>
+                      <a:r>
+                        <a:rPr lang="en-ID" sz="1100" dirty="0"/>
+                        <a:t>127%</a:t>
+                      </a:r>
                     </a:p>
                   </a:txBody>
                   <a:tcPr anchor="ctr">
@@ -10267,7 +11575,7 @@
                   </a:ext>
                 </a:extLst>
               </a:tr>
-              <a:tr h="282632">
+              <a:tr h="310778">
                 <a:tc>
                   <a:txBody>
                     <a:bodyPr/>
@@ -10349,7 +11657,7 @@
                       <a:pPr algn="ctr"/>
                       <a:r>
                         <a:rPr lang="en-ID" sz="1100" dirty="0"/>
-                        <a:t>2:15:00</a:t>
+                        <a:t>2:20:00</a:t>
                       </a:r>
                     </a:p>
                   </a:txBody>
@@ -10391,7 +11699,7 @@
                       <a:pPr algn="ctr"/>
                       <a:r>
                         <a:rPr lang="en-ID" sz="1100" dirty="0"/>
-                        <a:t>104%</a:t>
+                        <a:t>108%</a:t>
                       </a:r>
                     </a:p>
                   </a:txBody>
@@ -10422,7 +11730,7 @@
                   </a:ext>
                 </a:extLst>
               </a:tr>
-              <a:tr h="282632">
+              <a:tr h="310778">
                 <a:tc>
                   <a:txBody>
                     <a:bodyPr/>
@@ -10561,7 +11869,7 @@
                   </a:ext>
                 </a:extLst>
               </a:tr>
-              <a:tr h="282632">
+              <a:tr h="310778">
                 <a:tc>
                   <a:txBody>
                     <a:bodyPr/>
@@ -10700,7 +12008,7 @@
                   </a:ext>
                 </a:extLst>
               </a:tr>
-              <a:tr h="282632">
+              <a:tr h="469215">
                 <a:tc>
                   <a:txBody>
                     <a:bodyPr/>
@@ -10883,7 +12191,7 @@
                   </a:ext>
                 </a:extLst>
               </a:tr>
-              <a:tr h="282632">
+              <a:tr h="310778">
                 <a:tc>
                   <a:txBody>
                     <a:bodyPr/>
@@ -10965,7 +12273,10 @@
                     <a:lstStyle/>
                     <a:p>
                       <a:pPr algn="ctr"/>
-                      <a:endParaRPr lang="en-ID" sz="1100" dirty="0"/>
+                      <a:r>
+                        <a:rPr lang="en-ID" sz="1100" dirty="0"/>
+                        <a:t>50%</a:t>
+                      </a:r>
                     </a:p>
                   </a:txBody>
                   <a:tcPr anchor="ctr">
@@ -11013,7 +12324,10 @@
                     <a:lstStyle/>
                     <a:p>
                       <a:pPr algn="ctr"/>
-                      <a:endParaRPr lang="en-ID" sz="1100" dirty="0"/>
+                      <a:r>
+                        <a:rPr lang="en-ID" sz="1100" dirty="0"/>
+                        <a:t>2%</a:t>
+                      </a:r>
                     </a:p>
                   </a:txBody>
                   <a:tcPr anchor="ctr">
@@ -11052,7 +12366,7 @@
                   </a:ext>
                 </a:extLst>
               </a:tr>
-              <a:tr h="282632">
+              <a:tr h="621556">
                 <a:tc>
                   <a:txBody>
                     <a:bodyPr/>
@@ -11227,173 +12541,7 @@
                   </a:ext>
                 </a:extLst>
               </a:tr>
-              <a:tr h="282632">
-                <a:tc>
-                  <a:txBody>
-                    <a:bodyPr/>
-                    <a:lstStyle/>
-                    <a:p>
-                      <a:pPr algn="ctr"/>
-                      <a:r>
-                        <a:rPr lang="en-ID" sz="1100" dirty="0"/>
-                        <a:t>1k Database Valid</a:t>
-                      </a:r>
-                    </a:p>
-                  </a:txBody>
-                  <a:tcPr anchor="ctr">
-                    <a:lnT w="12700" cap="flat" cmpd="sng" algn="ctr">
-                      <a:solidFill>
-                        <a:schemeClr val="bg1"/>
-                      </a:solidFill>
-                      <a:prstDash val="solid"/>
-                      <a:round/>
-                      <a:headEnd type="none" w="med" len="med"/>
-                      <a:tailEnd type="none" w="med" len="med"/>
-                    </a:lnT>
-                    <a:lnB w="12700" cap="flat" cmpd="sng" algn="ctr">
-                      <a:solidFill>
-                        <a:schemeClr val="bg1"/>
-                      </a:solidFill>
-                      <a:prstDash val="solid"/>
-                      <a:round/>
-                      <a:headEnd type="none" w="med" len="med"/>
-                      <a:tailEnd type="none" w="med" len="med"/>
-                    </a:lnB>
-                  </a:tcPr>
-                </a:tc>
-                <a:tc>
-                  <a:txBody>
-                    <a:bodyPr/>
-                    <a:lstStyle/>
-                    <a:p>
-                      <a:pPr algn="ctr"/>
-                      <a:endParaRPr lang="en-ID" sz="1100" dirty="0"/>
-                    </a:p>
-                  </a:txBody>
-                  <a:tcPr anchor="ctr">
-                    <a:lnR w="12700" cap="flat" cmpd="sng" algn="ctr">
-                      <a:solidFill>
-                        <a:schemeClr val="bg1"/>
-                      </a:solidFill>
-                      <a:prstDash val="solid"/>
-                      <a:round/>
-                      <a:headEnd type="none" w="med" len="med"/>
-                      <a:tailEnd type="none" w="med" len="med"/>
-                    </a:lnR>
-                    <a:lnT w="12700" cap="flat" cmpd="sng" algn="ctr">
-                      <a:solidFill>
-                        <a:schemeClr val="bg1"/>
-                      </a:solidFill>
-                      <a:prstDash val="solid"/>
-                      <a:round/>
-                      <a:headEnd type="none" w="med" len="med"/>
-                      <a:tailEnd type="none" w="med" len="med"/>
-                    </a:lnT>
-                    <a:lnB w="12700" cap="flat" cmpd="sng" algn="ctr">
-                      <a:solidFill>
-                        <a:schemeClr val="bg1"/>
-                      </a:solidFill>
-                      <a:prstDash val="solid"/>
-                      <a:round/>
-                      <a:headEnd type="none" w="med" len="med"/>
-                      <a:tailEnd type="none" w="med" len="med"/>
-                    </a:lnB>
-                  </a:tcPr>
-                </a:tc>
-                <a:tc>
-                  <a:txBody>
-                    <a:bodyPr/>
-                    <a:lstStyle/>
-                    <a:p>
-                      <a:pPr algn="ctr"/>
-                      <a:endParaRPr lang="en-ID" sz="1100" dirty="0"/>
-                    </a:p>
-                  </a:txBody>
-                  <a:tcPr anchor="ctr">
-                    <a:lnL w="12700" cap="flat" cmpd="sng" algn="ctr">
-                      <a:solidFill>
-                        <a:schemeClr val="bg1"/>
-                      </a:solidFill>
-                      <a:prstDash val="solid"/>
-                      <a:round/>
-                      <a:headEnd type="none" w="med" len="med"/>
-                      <a:tailEnd type="none" w="med" len="med"/>
-                    </a:lnL>
-                    <a:lnR w="12700" cap="flat" cmpd="sng" algn="ctr">
-                      <a:solidFill>
-                        <a:schemeClr val="bg1"/>
-                      </a:solidFill>
-                      <a:prstDash val="solid"/>
-                      <a:round/>
-                      <a:headEnd type="none" w="med" len="med"/>
-                      <a:tailEnd type="none" w="med" len="med"/>
-                    </a:lnR>
-                    <a:lnT w="12700" cap="flat" cmpd="sng" algn="ctr">
-                      <a:solidFill>
-                        <a:schemeClr val="bg1"/>
-                      </a:solidFill>
-                      <a:prstDash val="solid"/>
-                      <a:round/>
-                      <a:headEnd type="none" w="med" len="med"/>
-                      <a:tailEnd type="none" w="med" len="med"/>
-                    </a:lnT>
-                    <a:lnB w="12700" cap="flat" cmpd="sng" algn="ctr">
-                      <a:solidFill>
-                        <a:schemeClr val="bg1"/>
-                      </a:solidFill>
-                      <a:prstDash val="solid"/>
-                      <a:round/>
-                      <a:headEnd type="none" w="med" len="med"/>
-                      <a:tailEnd type="none" w="med" len="med"/>
-                    </a:lnB>
-                  </a:tcPr>
-                </a:tc>
-                <a:tc>
-                  <a:txBody>
-                    <a:bodyPr/>
-                    <a:lstStyle/>
-                    <a:p>
-                      <a:pPr algn="ctr"/>
-                      <a:endParaRPr lang="en-ID" sz="1100" dirty="0"/>
-                    </a:p>
-                  </a:txBody>
-                  <a:tcPr anchor="ctr">
-                    <a:lnL w="12700" cap="flat" cmpd="sng" algn="ctr">
-                      <a:solidFill>
-                        <a:schemeClr val="bg1"/>
-                      </a:solidFill>
-                      <a:prstDash val="solid"/>
-                      <a:round/>
-                      <a:headEnd type="none" w="med" len="med"/>
-                      <a:tailEnd type="none" w="med" len="med"/>
-                    </a:lnL>
-                    <a:lnT w="12700" cap="flat" cmpd="sng" algn="ctr">
-                      <a:solidFill>
-                        <a:schemeClr val="bg1"/>
-                      </a:solidFill>
-                      <a:prstDash val="solid"/>
-                      <a:round/>
-                      <a:headEnd type="none" w="med" len="med"/>
-                      <a:tailEnd type="none" w="med" len="med"/>
-                    </a:lnT>
-                    <a:lnB w="12700" cap="flat" cmpd="sng" algn="ctr">
-                      <a:solidFill>
-                        <a:schemeClr val="bg1"/>
-                      </a:solidFill>
-                      <a:prstDash val="solid"/>
-                      <a:round/>
-                      <a:headEnd type="none" w="med" len="med"/>
-                      <a:tailEnd type="none" w="med" len="med"/>
-                    </a:lnB>
-                  </a:tcPr>
-                </a:tc>
-                <a:extLst>
-                  <a:ext uri="{0D108BD9-81ED-4DB2-BD59-A6C34878D82A}">
-                    <a16:rowId xmlns:a16="http://schemas.microsoft.com/office/drawing/2014/main" val="1345097426"/>
-                  </a:ext>
-                </a:extLst>
-              </a:tr>
-              <a:tr h="282632">
+              <a:tr h="310778">
                 <a:tc>
                   <a:txBody>
                     <a:bodyPr/>
@@ -11568,7 +12716,7 @@
                   </a:ext>
                 </a:extLst>
               </a:tr>
-              <a:tr h="282632">
+              <a:tr h="310778">
                 <a:tc>
                   <a:txBody>
                     <a:bodyPr/>
@@ -11613,7 +12761,10 @@
                     <a:lstStyle/>
                     <a:p>
                       <a:pPr algn="ctr"/>
-                      <a:endParaRPr lang="en-ID" sz="1100" dirty="0"/>
+                      <a:r>
+                        <a:rPr lang="en-ID" sz="1100" dirty="0"/>
+                        <a:t>116</a:t>
+                      </a:r>
                     </a:p>
                   </a:txBody>
                   <a:tcPr anchor="ctr">
@@ -11652,7 +12803,10 @@
                     <a:lstStyle/>
                     <a:p>
                       <a:pPr algn="ctr"/>
-                      <a:endParaRPr lang="en-ID" sz="1100" dirty="0"/>
+                      <a:r>
+                        <a:rPr lang="en-ID" sz="1100" dirty="0"/>
+                        <a:t>50</a:t>
+                      </a:r>
                     </a:p>
                   </a:txBody>
                   <a:tcPr anchor="ctr">
@@ -11700,7 +12854,10 @@
                     <a:lstStyle/>
                     <a:p>
                       <a:pPr algn="ctr"/>
-                      <a:endParaRPr lang="en-ID" sz="1100" dirty="0"/>
+                      <a:r>
+                        <a:rPr lang="en-ID" sz="1100" dirty="0"/>
+                        <a:t>232%</a:t>
+                      </a:r>
                     </a:p>
                   </a:txBody>
                   <a:tcPr anchor="ctr">
@@ -11739,7 +12896,7 @@
                   </a:ext>
                 </a:extLst>
               </a:tr>
-              <a:tr h="282632">
+              <a:tr h="310778">
                 <a:tc>
                   <a:txBody>
                     <a:bodyPr/>
@@ -11752,7 +12909,7 @@
                       </a:r>
                       <a:r>
                         <a:rPr lang="en-ID" sz="1100" dirty="0" err="1"/>
-                        <a:t>Qwantity</a:t>
+                        <a:t>Qwality</a:t>
                       </a:r>
                       <a:endParaRPr lang="en-ID" sz="1100" dirty="0"/>
                     </a:p>
@@ -11784,7 +12941,10 @@
                     <a:lstStyle/>
                     <a:p>
                       <a:pPr algn="ctr"/>
-                      <a:endParaRPr lang="en-ID" sz="1100" dirty="0"/>
+                      <a:r>
+                        <a:rPr lang="en-ID" sz="1100" dirty="0"/>
+                        <a:t>88,8</a:t>
+                      </a:r>
                     </a:p>
                   </a:txBody>
                   <a:tcPr anchor="ctr">
@@ -11823,7 +12983,10 @@
                     <a:lstStyle/>
                     <a:p>
                       <a:pPr algn="ctr"/>
-                      <a:endParaRPr lang="en-ID" sz="1100" dirty="0"/>
+                      <a:r>
+                        <a:rPr lang="en-ID" sz="1100" dirty="0"/>
+                        <a:t>85</a:t>
+                      </a:r>
                     </a:p>
                   </a:txBody>
                   <a:tcPr anchor="ctr">
@@ -11871,7 +13034,10 @@
                     <a:lstStyle/>
                     <a:p>
                       <a:pPr algn="ctr"/>
-                      <a:endParaRPr lang="en-ID" sz="1100" dirty="0"/>
+                      <a:r>
+                        <a:rPr lang="en-ID" sz="1100" dirty="0"/>
+                        <a:t>104%</a:t>
+                      </a:r>
                     </a:p>
                   </a:txBody>
                   <a:tcPr anchor="ctr">
@@ -11910,7 +13076,7 @@
                   </a:ext>
                 </a:extLst>
               </a:tr>
-              <a:tr h="282632">
+              <a:tr h="310778">
                 <a:tc>
                   <a:txBody>
                     <a:bodyPr/>
@@ -11941,7 +13107,10 @@
                     <a:lstStyle/>
                     <a:p>
                       <a:pPr algn="ctr"/>
-                      <a:endParaRPr lang="en-ID" sz="1100" dirty="0"/>
+                      <a:r>
+                        <a:rPr lang="en-ID" sz="1100" dirty="0"/>
+                        <a:t>77%</a:t>
+                      </a:r>
                     </a:p>
                   </a:txBody>
                   <a:tcPr anchor="ctr">
@@ -12013,7 +13182,10 @@
                     <a:lstStyle/>
                     <a:p>
                       <a:pPr algn="ctr"/>
-                      <a:endParaRPr lang="en-ID" sz="1100" dirty="0"/>
+                      <a:r>
+                        <a:rPr lang="en-ID" sz="1100" dirty="0"/>
+                        <a:t>110%</a:t>
+                      </a:r>
                     </a:p>
                   </a:txBody>
                   <a:tcPr anchor="ctr">
@@ -12062,14 +13234,14 @@
           <p:nvPr>
             <p:extLst>
               <p:ext uri="{D42A27DB-BD31-4B8C-83A1-F6EECF244321}">
-                <p14:modId xmlns:p14="http://schemas.microsoft.com/office/powerpoint/2010/main" val="1384005925"/>
+                <p14:modId xmlns:p14="http://schemas.microsoft.com/office/powerpoint/2010/main" val="2758151025"/>
               </p:ext>
             </p:extLst>
           </p:nvPr>
         </p:nvGraphicFramePr>
         <p:xfrm>
           <a:off x="3387855" y="913639"/>
-          <a:ext cx="3085297" cy="2011680"/>
+          <a:ext cx="3085297" cy="1493520"/>
         </p:xfrm>
         <a:graphic>
           <a:graphicData uri="http://schemas.openxmlformats.org/drawingml/2006/table">
@@ -12271,7 +13443,10 @@
                     <a:lstStyle/>
                     <a:p>
                       <a:pPr algn="ctr"/>
-                      <a:endParaRPr lang="en-ID" sz="1100" dirty="0"/>
+                      <a:r>
+                        <a:rPr lang="en-ID" sz="1100" dirty="0"/>
+                        <a:t>90%</a:t>
+                      </a:r>
                     </a:p>
                   </a:txBody>
                   <a:tcPr anchor="ctr">
@@ -12301,7 +13476,10 @@
                     <a:lstStyle/>
                     <a:p>
                       <a:pPr algn="ctr"/>
-                      <a:endParaRPr lang="en-ID" sz="1100" dirty="0"/>
+                      <a:r>
+                        <a:rPr lang="en-ID" sz="1100" dirty="0"/>
+                        <a:t>101%</a:t>
+                      </a:r>
                     </a:p>
                   </a:txBody>
                   <a:tcPr anchor="ctr">
@@ -12343,7 +13521,10 @@
                     <a:lstStyle/>
                     <a:p>
                       <a:pPr algn="ctr"/>
-                      <a:endParaRPr lang="en-ID" sz="1100" dirty="0"/>
+                      <a:r>
+                        <a:rPr lang="en-ID" sz="1100" dirty="0"/>
+                        <a:t>465</a:t>
+                      </a:r>
                     </a:p>
                   </a:txBody>
                   <a:tcPr anchor="ctr">
@@ -12364,7 +13545,10 @@
                     <a:lstStyle/>
                     <a:p>
                       <a:pPr algn="ctr"/>
-                      <a:endParaRPr lang="en-ID" sz="1100" dirty="0"/>
+                      <a:r>
+                        <a:rPr lang="en-ID" sz="1100" dirty="0"/>
+                        <a:t>450</a:t>
+                      </a:r>
                     </a:p>
                   </a:txBody>
                   <a:tcPr anchor="ctr">
@@ -12394,7 +13578,10 @@
                     <a:lstStyle/>
                     <a:p>
                       <a:pPr algn="ctr"/>
-                      <a:endParaRPr lang="en-ID" sz="1100" dirty="0"/>
+                      <a:r>
+                        <a:rPr lang="en-ID" sz="1100" dirty="0"/>
+                        <a:t>103%</a:t>
+                      </a:r>
                     </a:p>
                   </a:txBody>
                   <a:tcPr anchor="ctr">
@@ -12436,7 +13623,10 @@
                     <a:lstStyle/>
                     <a:p>
                       <a:pPr algn="ctr"/>
-                      <a:endParaRPr lang="en-ID" sz="1100" dirty="0"/>
+                      <a:r>
+                        <a:rPr lang="en-ID" sz="1100" dirty="0"/>
+                        <a:t>84%</a:t>
+                      </a:r>
                     </a:p>
                   </a:txBody>
                   <a:tcPr anchor="ctr">
@@ -12457,7 +13647,10 @@
                     <a:lstStyle/>
                     <a:p>
                       <a:pPr algn="ctr"/>
-                      <a:endParaRPr lang="en-ID" sz="1100" dirty="0"/>
+                      <a:r>
+                        <a:rPr lang="en-ID" sz="1100" dirty="0"/>
+                        <a:t>90%</a:t>
+                      </a:r>
                     </a:p>
                   </a:txBody>
                   <a:tcPr anchor="ctr">
@@ -12487,7 +13680,10 @@
                     <a:lstStyle/>
                     <a:p>
                       <a:pPr algn="ctr"/>
-                      <a:endParaRPr lang="en-ID" sz="1100" dirty="0"/>
+                      <a:r>
+                        <a:rPr lang="en-ID" sz="1100" dirty="0"/>
+                        <a:t>93%</a:t>
+                      </a:r>
                     </a:p>
                   </a:txBody>
                   <a:tcPr anchor="ctr">
@@ -12508,7 +13704,7 @@
                   </a:ext>
                 </a:extLst>
               </a:tr>
-              <a:tr h="0">
+              <a:tr h="209203">
                 <a:tc>
                   <a:txBody>
                     <a:bodyPr/>
@@ -12553,7 +13749,10 @@
                     <a:lstStyle/>
                     <a:p>
                       <a:pPr algn="ctr"/>
-                      <a:endParaRPr lang="en-ID" sz="1100" dirty="0"/>
+                      <a:r>
+                        <a:rPr lang="en-ID" sz="1100" dirty="0"/>
+                        <a:t>70%</a:t>
+                      </a:r>
                     </a:p>
                   </a:txBody>
                   <a:tcPr anchor="ctr">
@@ -12583,7 +13782,10 @@
                     <a:lstStyle/>
                     <a:p>
                       <a:pPr algn="ctr"/>
-                      <a:endParaRPr lang="en-ID" sz="1100" dirty="0"/>
+                      <a:r>
+                        <a:rPr lang="en-ID" sz="1100" dirty="0"/>
+                        <a:t>112%</a:t>
+                      </a:r>
                     </a:p>
                   </a:txBody>
                   <a:tcPr anchor="ctr">
@@ -12601,206 +13803,6 @@
                 <a:extLst>
                   <a:ext uri="{0D108BD9-81ED-4DB2-BD59-A6C34878D82A}">
                     <a16:rowId xmlns:a16="http://schemas.microsoft.com/office/drawing/2014/main" val="3227798701"/>
-                  </a:ext>
-                </a:extLst>
-              </a:tr>
-              <a:tr h="0">
-                <a:tc>
-                  <a:txBody>
-                    <a:bodyPr/>
-                    <a:lstStyle/>
-                    <a:p>
-                      <a:pPr algn="ctr"/>
-                      <a:r>
-                        <a:rPr lang="en-ID" sz="1100" dirty="0" err="1"/>
-                        <a:t>CRt</a:t>
-                      </a:r>
-                      <a:r>
-                        <a:rPr lang="en-ID" sz="1100" dirty="0"/>
-                        <a:t> 1K same outlet</a:t>
-                      </a:r>
-                    </a:p>
-                  </a:txBody>
-                  <a:tcPr anchor="ctr"/>
-                </a:tc>
-                <a:tc>
-                  <a:txBody>
-                    <a:bodyPr/>
-                    <a:lstStyle/>
-                    <a:p>
-                      <a:pPr algn="ctr"/>
-                      <a:endParaRPr lang="en-ID" sz="1100" dirty="0"/>
-                    </a:p>
-                  </a:txBody>
-                  <a:tcPr anchor="ctr">
-                    <a:lnR w="12700" cap="flat" cmpd="sng" algn="ctr">
-                      <a:solidFill>
-                        <a:schemeClr val="bg1"/>
-                      </a:solidFill>
-                      <a:prstDash val="solid"/>
-                      <a:round/>
-                      <a:headEnd type="none" w="med" len="med"/>
-                      <a:tailEnd type="none" w="med" len="med"/>
-                    </a:lnR>
-                  </a:tcPr>
-                </a:tc>
-                <a:tc>
-                  <a:txBody>
-                    <a:bodyPr/>
-                    <a:lstStyle/>
-                    <a:p>
-                      <a:pPr algn="ctr"/>
-                      <a:r>
-                        <a:rPr lang="en-ID" sz="1100" dirty="0"/>
-                        <a:t>92%</a:t>
-                      </a:r>
-                    </a:p>
-                  </a:txBody>
-                  <a:tcPr anchor="ctr">
-                    <a:lnL w="12700" cap="flat" cmpd="sng" algn="ctr">
-                      <a:solidFill>
-                        <a:schemeClr val="bg1"/>
-                      </a:solidFill>
-                      <a:prstDash val="solid"/>
-                      <a:round/>
-                      <a:headEnd type="none" w="med" len="med"/>
-                      <a:tailEnd type="none" w="med" len="med"/>
-                    </a:lnL>
-                    <a:lnR w="12700" cap="flat" cmpd="sng" algn="ctr">
-                      <a:solidFill>
-                        <a:schemeClr val="bg1"/>
-                      </a:solidFill>
-                      <a:prstDash val="solid"/>
-                      <a:round/>
-                      <a:headEnd type="none" w="med" len="med"/>
-                      <a:tailEnd type="none" w="med" len="med"/>
-                    </a:lnR>
-                  </a:tcPr>
-                </a:tc>
-                <a:tc>
-                  <a:txBody>
-                    <a:bodyPr/>
-                    <a:lstStyle/>
-                    <a:p>
-                      <a:pPr algn="ctr"/>
-                      <a:endParaRPr lang="en-ID" sz="1100" dirty="0"/>
-                    </a:p>
-                  </a:txBody>
-                  <a:tcPr anchor="ctr">
-                    <a:lnL w="12700" cap="flat" cmpd="sng" algn="ctr">
-                      <a:solidFill>
-                        <a:schemeClr val="bg1"/>
-                      </a:solidFill>
-                      <a:prstDash val="solid"/>
-                      <a:round/>
-                      <a:headEnd type="none" w="med" len="med"/>
-                      <a:tailEnd type="none" w="med" len="med"/>
-                    </a:lnL>
-                  </a:tcPr>
-                </a:tc>
-                <a:extLst>
-                  <a:ext uri="{0D108BD9-81ED-4DB2-BD59-A6C34878D82A}">
-                    <a16:rowId xmlns:a16="http://schemas.microsoft.com/office/drawing/2014/main" val="2469719646"/>
-                  </a:ext>
-                </a:extLst>
-              </a:tr>
-              <a:tr h="209203">
-                <a:tc>
-                  <a:txBody>
-                    <a:bodyPr/>
-                    <a:lstStyle/>
-                    <a:p>
-                      <a:pPr algn="ctr"/>
-                      <a:r>
-                        <a:rPr lang="en-ID" sz="1100" dirty="0" err="1"/>
-                        <a:t>Crt</a:t>
-                      </a:r>
-                      <a:r>
-                        <a:rPr lang="en-ID" sz="1100" dirty="0"/>
-                        <a:t> 10K-80K</a:t>
-                      </a:r>
-                    </a:p>
-                  </a:txBody>
-                  <a:tcPr anchor="ctr"/>
-                </a:tc>
-                <a:tc>
-                  <a:txBody>
-                    <a:bodyPr/>
-                    <a:lstStyle/>
-                    <a:p>
-                      <a:pPr algn="ctr"/>
-                      <a:endParaRPr lang="en-ID" sz="1100" dirty="0"/>
-                    </a:p>
-                  </a:txBody>
-                  <a:tcPr anchor="ctr">
-                    <a:lnR w="12700" cap="flat" cmpd="sng" algn="ctr">
-                      <a:solidFill>
-                        <a:schemeClr val="bg1"/>
-                      </a:solidFill>
-                      <a:prstDash val="solid"/>
-                      <a:round/>
-                      <a:headEnd type="none" w="med" len="med"/>
-                      <a:tailEnd type="none" w="med" len="med"/>
-                    </a:lnR>
-                  </a:tcPr>
-                </a:tc>
-                <a:tc>
-                  <a:txBody>
-                    <a:bodyPr/>
-                    <a:lstStyle/>
-                    <a:p>
-                      <a:pPr algn="ctr"/>
-                      <a:r>
-                        <a:rPr lang="en-ID" sz="1100" dirty="0"/>
-                        <a:t>68%</a:t>
-                      </a:r>
-                    </a:p>
-                  </a:txBody>
-                  <a:tcPr anchor="ctr">
-                    <a:lnL w="12700" cap="flat" cmpd="sng" algn="ctr">
-                      <a:solidFill>
-                        <a:schemeClr val="bg1"/>
-                      </a:solidFill>
-                      <a:prstDash val="solid"/>
-                      <a:round/>
-                      <a:headEnd type="none" w="med" len="med"/>
-                      <a:tailEnd type="none" w="med" len="med"/>
-                    </a:lnL>
-                    <a:lnR w="12700" cap="flat" cmpd="sng" algn="ctr">
-                      <a:solidFill>
-                        <a:schemeClr val="bg1"/>
-                      </a:solidFill>
-                      <a:prstDash val="solid"/>
-                      <a:round/>
-                      <a:headEnd type="none" w="med" len="med"/>
-                      <a:tailEnd type="none" w="med" len="med"/>
-                    </a:lnR>
-                  </a:tcPr>
-                </a:tc>
-                <a:tc>
-                  <a:txBody>
-                    <a:bodyPr/>
-                    <a:lstStyle/>
-                    <a:p>
-                      <a:pPr algn="ctr"/>
-                      <a:endParaRPr lang="en-ID" sz="1100" dirty="0"/>
-                    </a:p>
-                  </a:txBody>
-                  <a:tcPr anchor="ctr">
-                    <a:lnL w="12700" cap="flat" cmpd="sng" algn="ctr">
-                      <a:solidFill>
-                        <a:schemeClr val="bg1"/>
-                      </a:solidFill>
-                      <a:prstDash val="solid"/>
-                      <a:round/>
-                      <a:headEnd type="none" w="med" len="med"/>
-                      <a:tailEnd type="none" w="med" len="med"/>
-                    </a:lnL>
-                  </a:tcPr>
-                </a:tc>
-                <a:extLst>
-                  <a:ext uri="{0D108BD9-81ED-4DB2-BD59-A6C34878D82A}">
-                    <a16:rowId xmlns:a16="http://schemas.microsoft.com/office/drawing/2014/main" val="348281208"/>
                   </a:ext>
                 </a:extLst>
               </a:tr>
@@ -13243,6 +14245,594 @@
             <a:r>
               <a:rPr lang="en-ID" b="1" dirty="0"/>
               <a:t>Employee Satisfaction</a:t>
+            </a:r>
+          </a:p>
+        </p:txBody>
+      </p:sp>
+      <p:sp>
+        <p:nvSpPr>
+          <p:cNvPr id="14" name="Rectangle: Rounded Corners 13">
+            <a:extLst>
+              <a:ext uri="{FF2B5EF4-FFF2-40B4-BE49-F238E27FC236}">
+                <a16:creationId xmlns:a16="http://schemas.microsoft.com/office/drawing/2014/main" id="{D5B99619-EC99-4EB1-8C80-A827D7A5F5CD}"/>
+              </a:ext>
+            </a:extLst>
+          </p:cNvPr>
+          <p:cNvSpPr/>
+          <p:nvPr/>
+        </p:nvSpPr>
+        <p:spPr>
+          <a:xfrm>
+            <a:off x="88873" y="3425482"/>
+            <a:ext cx="3112114" cy="235634"/>
+          </a:xfrm>
+          <a:prstGeom prst="roundRect">
+            <a:avLst/>
+          </a:prstGeom>
+          <a:noFill/>
+          <a:ln w="25400">
+            <a:solidFill>
+              <a:srgbClr val="FF0000"/>
+            </a:solidFill>
+          </a:ln>
+        </p:spPr>
+        <p:style>
+          <a:lnRef idx="2">
+            <a:schemeClr val="accent1">
+              <a:shade val="50000"/>
+            </a:schemeClr>
+          </a:lnRef>
+          <a:fillRef idx="1">
+            <a:schemeClr val="accent1"/>
+          </a:fillRef>
+          <a:effectRef idx="0">
+            <a:schemeClr val="accent1"/>
+          </a:effectRef>
+          <a:fontRef idx="minor">
+            <a:schemeClr val="lt1"/>
+          </a:fontRef>
+        </p:style>
+        <p:txBody>
+          <a:bodyPr rtlCol="0" anchor="ctr"/>
+          <a:lstStyle/>
+          <a:p>
+            <a:pPr algn="ctr"/>
+            <a:endParaRPr lang="en-ID"/>
+          </a:p>
+        </p:txBody>
+      </p:sp>
+      <p:sp>
+        <p:nvSpPr>
+          <p:cNvPr id="15" name="Rectangle: Rounded Corners 14">
+            <a:extLst>
+              <a:ext uri="{FF2B5EF4-FFF2-40B4-BE49-F238E27FC236}">
+                <a16:creationId xmlns:a16="http://schemas.microsoft.com/office/drawing/2014/main" id="{A4736A1D-51FC-4404-9173-C91F0A5F0AFC}"/>
+              </a:ext>
+            </a:extLst>
+          </p:cNvPr>
+          <p:cNvSpPr/>
+          <p:nvPr/>
+        </p:nvSpPr>
+        <p:spPr>
+          <a:xfrm>
+            <a:off x="88873" y="3694526"/>
+            <a:ext cx="3112114" cy="365292"/>
+          </a:xfrm>
+          <a:prstGeom prst="roundRect">
+            <a:avLst/>
+          </a:prstGeom>
+          <a:noFill/>
+          <a:ln w="25400">
+            <a:solidFill>
+              <a:srgbClr val="FF0000"/>
+            </a:solidFill>
+          </a:ln>
+        </p:spPr>
+        <p:style>
+          <a:lnRef idx="2">
+            <a:schemeClr val="accent1">
+              <a:shade val="50000"/>
+            </a:schemeClr>
+          </a:lnRef>
+          <a:fillRef idx="1">
+            <a:schemeClr val="accent1"/>
+          </a:fillRef>
+          <a:effectRef idx="0">
+            <a:schemeClr val="accent1"/>
+          </a:effectRef>
+          <a:fontRef idx="minor">
+            <a:schemeClr val="lt1"/>
+          </a:fontRef>
+        </p:style>
+        <p:txBody>
+          <a:bodyPr rtlCol="0" anchor="ctr"/>
+          <a:lstStyle/>
+          <a:p>
+            <a:pPr algn="ctr"/>
+            <a:endParaRPr lang="en-ID"/>
+          </a:p>
+        </p:txBody>
+      </p:sp>
+      <p:sp>
+        <p:nvSpPr>
+          <p:cNvPr id="16" name="Rectangle: Rounded Corners 15">
+            <a:extLst>
+              <a:ext uri="{FF2B5EF4-FFF2-40B4-BE49-F238E27FC236}">
+                <a16:creationId xmlns:a16="http://schemas.microsoft.com/office/drawing/2014/main" id="{F2507E1D-5084-4193-8D4A-F78FC342F1B0}"/>
+              </a:ext>
+            </a:extLst>
+          </p:cNvPr>
+          <p:cNvSpPr/>
+          <p:nvPr/>
+        </p:nvSpPr>
+        <p:spPr>
+          <a:xfrm>
+            <a:off x="80023" y="5472335"/>
+            <a:ext cx="3112114" cy="235634"/>
+          </a:xfrm>
+          <a:prstGeom prst="roundRect">
+            <a:avLst/>
+          </a:prstGeom>
+          <a:noFill/>
+          <a:ln w="25400">
+            <a:solidFill>
+              <a:srgbClr val="FF0000"/>
+            </a:solidFill>
+          </a:ln>
+        </p:spPr>
+        <p:style>
+          <a:lnRef idx="2">
+            <a:schemeClr val="accent1">
+              <a:shade val="50000"/>
+            </a:schemeClr>
+          </a:lnRef>
+          <a:fillRef idx="1">
+            <a:schemeClr val="accent1"/>
+          </a:fillRef>
+          <a:effectRef idx="0">
+            <a:schemeClr val="accent1"/>
+          </a:effectRef>
+          <a:fontRef idx="minor">
+            <a:schemeClr val="lt1"/>
+          </a:fontRef>
+        </p:style>
+        <p:txBody>
+          <a:bodyPr rtlCol="0" anchor="ctr"/>
+          <a:lstStyle/>
+          <a:p>
+            <a:pPr algn="ctr"/>
+            <a:endParaRPr lang="en-ID"/>
+          </a:p>
+        </p:txBody>
+      </p:sp>
+      <p:sp>
+        <p:nvSpPr>
+          <p:cNvPr id="17" name="Rectangle: Rounded Corners 16">
+            <a:extLst>
+              <a:ext uri="{FF2B5EF4-FFF2-40B4-BE49-F238E27FC236}">
+                <a16:creationId xmlns:a16="http://schemas.microsoft.com/office/drawing/2014/main" id="{C7E26C8F-258E-4424-9A81-C983C0A7B5D7}"/>
+              </a:ext>
+            </a:extLst>
+          </p:cNvPr>
+          <p:cNvSpPr/>
+          <p:nvPr/>
+        </p:nvSpPr>
+        <p:spPr>
+          <a:xfrm>
+            <a:off x="80023" y="4498150"/>
+            <a:ext cx="3112114" cy="235634"/>
+          </a:xfrm>
+          <a:prstGeom prst="roundRect">
+            <a:avLst/>
+          </a:prstGeom>
+          <a:noFill/>
+          <a:ln w="25400">
+            <a:solidFill>
+              <a:srgbClr val="FF0000"/>
+            </a:solidFill>
+          </a:ln>
+        </p:spPr>
+        <p:style>
+          <a:lnRef idx="2">
+            <a:schemeClr val="accent1">
+              <a:shade val="50000"/>
+            </a:schemeClr>
+          </a:lnRef>
+          <a:fillRef idx="1">
+            <a:schemeClr val="accent1"/>
+          </a:fillRef>
+          <a:effectRef idx="0">
+            <a:schemeClr val="accent1"/>
+          </a:effectRef>
+          <a:fontRef idx="minor">
+            <a:schemeClr val="lt1"/>
+          </a:fontRef>
+        </p:style>
+        <p:txBody>
+          <a:bodyPr rtlCol="0" anchor="ctr"/>
+          <a:lstStyle/>
+          <a:p>
+            <a:pPr algn="ctr"/>
+            <a:endParaRPr lang="en-ID"/>
+          </a:p>
+        </p:txBody>
+      </p:sp>
+      <p:sp>
+        <p:nvSpPr>
+          <p:cNvPr id="18" name="Rectangle: Rounded Corners 17">
+            <a:extLst>
+              <a:ext uri="{FF2B5EF4-FFF2-40B4-BE49-F238E27FC236}">
+                <a16:creationId xmlns:a16="http://schemas.microsoft.com/office/drawing/2014/main" id="{CC4C76D1-AB55-4275-898E-43EED047C892}"/>
+              </a:ext>
+            </a:extLst>
+          </p:cNvPr>
+          <p:cNvSpPr/>
+          <p:nvPr/>
+        </p:nvSpPr>
+        <p:spPr>
+          <a:xfrm>
+            <a:off x="3387855" y="1923713"/>
+            <a:ext cx="3112114" cy="235634"/>
+          </a:xfrm>
+          <a:prstGeom prst="roundRect">
+            <a:avLst/>
+          </a:prstGeom>
+          <a:noFill/>
+          <a:ln w="25400">
+            <a:solidFill>
+              <a:srgbClr val="FF0000"/>
+            </a:solidFill>
+          </a:ln>
+        </p:spPr>
+        <p:style>
+          <a:lnRef idx="2">
+            <a:schemeClr val="accent1">
+              <a:shade val="50000"/>
+            </a:schemeClr>
+          </a:lnRef>
+          <a:fillRef idx="1">
+            <a:schemeClr val="accent1"/>
+          </a:fillRef>
+          <a:effectRef idx="0">
+            <a:schemeClr val="accent1"/>
+          </a:effectRef>
+          <a:fontRef idx="minor">
+            <a:schemeClr val="lt1"/>
+          </a:fontRef>
+        </p:style>
+        <p:txBody>
+          <a:bodyPr rtlCol="0" anchor="ctr"/>
+          <a:lstStyle/>
+          <a:p>
+            <a:pPr algn="ctr"/>
+            <a:endParaRPr lang="en-ID"/>
+          </a:p>
+        </p:txBody>
+      </p:sp>
+      <p:sp>
+        <p:nvSpPr>
+          <p:cNvPr id="22" name="TextBox 21">
+            <a:extLst>
+              <a:ext uri="{FF2B5EF4-FFF2-40B4-BE49-F238E27FC236}">
+                <a16:creationId xmlns:a16="http://schemas.microsoft.com/office/drawing/2014/main" id="{EBD5B463-49A3-4AE8-A578-63D0B164EE81}"/>
+              </a:ext>
+            </a:extLst>
+          </p:cNvPr>
+          <p:cNvSpPr txBox="1"/>
+          <p:nvPr/>
+        </p:nvSpPr>
+        <p:spPr>
+          <a:xfrm>
+            <a:off x="6695688" y="526924"/>
+            <a:ext cx="3027706" cy="369332"/>
+          </a:xfrm>
+          <a:prstGeom prst="rect">
+            <a:avLst/>
+          </a:prstGeom>
+          <a:noFill/>
+        </p:spPr>
+        <p:txBody>
+          <a:bodyPr wrap="square" rtlCol="0">
+            <a:spAutoFit/>
+          </a:bodyPr>
+          <a:lstStyle/>
+          <a:p>
+            <a:r>
+              <a:rPr lang="en-ID" b="1" dirty="0"/>
+              <a:t>Pareto Problem</a:t>
+            </a:r>
+          </a:p>
+        </p:txBody>
+      </p:sp>
+      <p:sp>
+        <p:nvSpPr>
+          <p:cNvPr id="2" name="Rectangle 1">
+            <a:extLst>
+              <a:ext uri="{FF2B5EF4-FFF2-40B4-BE49-F238E27FC236}">
+                <a16:creationId xmlns:a16="http://schemas.microsoft.com/office/drawing/2014/main" id="{EC11C9CC-30B9-4C53-B30A-5C6237CE81DE}"/>
+              </a:ext>
+            </a:extLst>
+          </p:cNvPr>
+          <p:cNvSpPr/>
+          <p:nvPr/>
+        </p:nvSpPr>
+        <p:spPr>
+          <a:xfrm>
+            <a:off x="7033846" y="1688123"/>
+            <a:ext cx="3688694" cy="1972994"/>
+          </a:xfrm>
+          <a:prstGeom prst="rect">
+            <a:avLst/>
+          </a:prstGeom>
+          <a:solidFill>
+            <a:schemeClr val="accent2">
+              <a:lumMod val="40000"/>
+              <a:lumOff val="60000"/>
+            </a:schemeClr>
+          </a:solidFill>
+          <a:ln>
+            <a:noFill/>
+          </a:ln>
+        </p:spPr>
+        <p:style>
+          <a:lnRef idx="2">
+            <a:schemeClr val="accent1">
+              <a:shade val="50000"/>
+            </a:schemeClr>
+          </a:lnRef>
+          <a:fillRef idx="1">
+            <a:schemeClr val="accent1"/>
+          </a:fillRef>
+          <a:effectRef idx="0">
+            <a:schemeClr val="accent1"/>
+          </a:effectRef>
+          <a:fontRef idx="minor">
+            <a:schemeClr val="lt1"/>
+          </a:fontRef>
+        </p:style>
+        <p:txBody>
+          <a:bodyPr rtlCol="0" anchor="ctr"/>
+          <a:lstStyle/>
+          <a:p>
+            <a:pPr algn="ctr"/>
+            <a:endParaRPr lang="en-ID"/>
+          </a:p>
+        </p:txBody>
+      </p:sp>
+      <p:graphicFrame>
+        <p:nvGraphicFramePr>
+          <p:cNvPr id="26" name="Chart 25">
+            <a:extLst>
+              <a:ext uri="{FF2B5EF4-FFF2-40B4-BE49-F238E27FC236}">
+                <a16:creationId xmlns:a16="http://schemas.microsoft.com/office/drawing/2014/main" id="{657219A5-853A-4DA1-85E9-907F1F4386C3}"/>
+              </a:ext>
+            </a:extLst>
+          </p:cNvPr>
+          <p:cNvGraphicFramePr>
+            <a:graphicFrameLocks/>
+          </p:cNvGraphicFramePr>
+          <p:nvPr>
+            <p:extLst>
+              <p:ext uri="{D42A27DB-BD31-4B8C-83A1-F6EECF244321}">
+                <p14:modId xmlns:p14="http://schemas.microsoft.com/office/powerpoint/2010/main" val="46061565"/>
+              </p:ext>
+            </p:extLst>
+          </p:nvPr>
+        </p:nvGraphicFramePr>
+        <p:xfrm>
+          <a:off x="6695688" y="921962"/>
+          <a:ext cx="5275918" cy="2739154"/>
+        </p:xfrm>
+        <a:graphic>
+          <a:graphicData uri="http://schemas.openxmlformats.org/drawingml/2006/chart">
+            <c:chart xmlns:c="http://schemas.openxmlformats.org/drawingml/2006/chart" xmlns:r="http://schemas.openxmlformats.org/officeDocument/2006/relationships" r:id="rId3"/>
+          </a:graphicData>
+        </a:graphic>
+      </p:graphicFrame>
+      <p:sp>
+        <p:nvSpPr>
+          <p:cNvPr id="27" name="TextBox 26">
+            <a:extLst>
+              <a:ext uri="{FF2B5EF4-FFF2-40B4-BE49-F238E27FC236}">
+                <a16:creationId xmlns:a16="http://schemas.microsoft.com/office/drawing/2014/main" id="{3F4B627A-37E8-4A6A-8CE1-8D32EE6E5DC2}"/>
+              </a:ext>
+            </a:extLst>
+          </p:cNvPr>
+          <p:cNvSpPr txBox="1"/>
+          <p:nvPr/>
+        </p:nvSpPr>
+        <p:spPr>
+          <a:xfrm>
+            <a:off x="6819952" y="3760826"/>
+            <a:ext cx="3027706" cy="369332"/>
+          </a:xfrm>
+          <a:prstGeom prst="rect">
+            <a:avLst/>
+          </a:prstGeom>
+          <a:noFill/>
+        </p:spPr>
+        <p:txBody>
+          <a:bodyPr wrap="square" rtlCol="0">
+            <a:spAutoFit/>
+          </a:bodyPr>
+          <a:lstStyle/>
+          <a:p>
+            <a:r>
+              <a:rPr lang="en-ID" b="1" dirty="0" err="1"/>
+              <a:t>Fokus</a:t>
+            </a:r>
+            <a:r>
+              <a:rPr lang="en-ID" b="1" dirty="0"/>
+              <a:t> Problem</a:t>
+            </a:r>
+          </a:p>
+        </p:txBody>
+      </p:sp>
+      <p:sp>
+        <p:nvSpPr>
+          <p:cNvPr id="3" name="Rectangle: Rounded Corners 2">
+            <a:extLst>
+              <a:ext uri="{FF2B5EF4-FFF2-40B4-BE49-F238E27FC236}">
+                <a16:creationId xmlns:a16="http://schemas.microsoft.com/office/drawing/2014/main" id="{69796CC9-2B18-4EAA-A414-12B893F2F7C6}"/>
+              </a:ext>
+            </a:extLst>
+          </p:cNvPr>
+          <p:cNvSpPr/>
+          <p:nvPr/>
+        </p:nvSpPr>
+        <p:spPr>
+          <a:xfrm>
+            <a:off x="7033846" y="4304714"/>
+            <a:ext cx="4937760" cy="2349304"/>
+          </a:xfrm>
+          <a:prstGeom prst="roundRect">
+            <a:avLst/>
+          </a:prstGeom>
+          <a:solidFill>
+            <a:schemeClr val="accent2">
+              <a:lumMod val="40000"/>
+              <a:lumOff val="60000"/>
+            </a:schemeClr>
+          </a:solidFill>
+          <a:ln>
+            <a:noFill/>
+          </a:ln>
+        </p:spPr>
+        <p:style>
+          <a:lnRef idx="2">
+            <a:schemeClr val="accent1">
+              <a:shade val="50000"/>
+            </a:schemeClr>
+          </a:lnRef>
+          <a:fillRef idx="1">
+            <a:schemeClr val="accent1"/>
+          </a:fillRef>
+          <a:effectRef idx="0">
+            <a:schemeClr val="accent1"/>
+          </a:effectRef>
+          <a:fontRef idx="minor">
+            <a:schemeClr val="lt1"/>
+          </a:fontRef>
+        </p:style>
+        <p:txBody>
+          <a:bodyPr rtlCol="0" anchor="ctr"/>
+          <a:lstStyle/>
+          <a:p>
+            <a:r>
+              <a:rPr lang="en-ID" sz="2000" b="1" dirty="0" err="1">
+                <a:solidFill>
+                  <a:schemeClr val="tx1"/>
+                </a:solidFill>
+              </a:rPr>
+              <a:t>Fokus</a:t>
+            </a:r>
+            <a:r>
+              <a:rPr lang="en-ID" sz="2000" b="1" dirty="0">
+                <a:solidFill>
+                  <a:schemeClr val="tx1"/>
+                </a:solidFill>
+              </a:rPr>
+              <a:t> </a:t>
+            </a:r>
+            <a:r>
+              <a:rPr lang="en-ID" sz="2000" b="1" dirty="0" err="1">
+                <a:solidFill>
+                  <a:schemeClr val="tx1"/>
+                </a:solidFill>
+              </a:rPr>
+              <a:t>masalah</a:t>
+            </a:r>
+            <a:r>
+              <a:rPr lang="en-ID" sz="2000" b="1" dirty="0">
+                <a:solidFill>
+                  <a:schemeClr val="tx1"/>
+                </a:solidFill>
+              </a:rPr>
+              <a:t> yang </a:t>
+            </a:r>
+            <a:r>
+              <a:rPr lang="en-ID" sz="2000" b="1" dirty="0" err="1">
+                <a:solidFill>
+                  <a:schemeClr val="tx1"/>
+                </a:solidFill>
+              </a:rPr>
+              <a:t>akan</a:t>
+            </a:r>
+            <a:r>
+              <a:rPr lang="en-ID" sz="2000" b="1" dirty="0">
+                <a:solidFill>
+                  <a:schemeClr val="tx1"/>
+                </a:solidFill>
+              </a:rPr>
+              <a:t> </a:t>
+            </a:r>
+            <a:r>
+              <a:rPr lang="en-ID" sz="2000" b="1" dirty="0" err="1">
+                <a:solidFill>
+                  <a:schemeClr val="tx1"/>
+                </a:solidFill>
+              </a:rPr>
+              <a:t>diselesaikan</a:t>
+            </a:r>
+            <a:r>
+              <a:rPr lang="en-ID" sz="2000" b="1" dirty="0">
+                <a:solidFill>
+                  <a:schemeClr val="tx1"/>
+                </a:solidFill>
+              </a:rPr>
+              <a:t>  :</a:t>
+            </a:r>
+          </a:p>
+          <a:p>
+            <a:pPr marL="342900" indent="-342900">
+              <a:buAutoNum type="arabicPeriod"/>
+            </a:pPr>
+            <a:r>
+              <a:rPr lang="en-ID" dirty="0">
+                <a:solidFill>
+                  <a:schemeClr val="tx1"/>
+                </a:solidFill>
+              </a:rPr>
+              <a:t>EM Contribution</a:t>
+            </a:r>
+          </a:p>
+          <a:p>
+            <a:pPr marL="342900" indent="-342900">
+              <a:buAutoNum type="arabicPeriod"/>
+            </a:pPr>
+            <a:r>
+              <a:rPr lang="en-ID" dirty="0">
+                <a:solidFill>
+                  <a:schemeClr val="tx1"/>
+                </a:solidFill>
+              </a:rPr>
+              <a:t>Appointment Rate</a:t>
+            </a:r>
+          </a:p>
+          <a:p>
+            <a:pPr marL="342900" indent="-342900">
+              <a:buAutoNum type="arabicPeriod"/>
+            </a:pPr>
+            <a:r>
+              <a:rPr lang="en-ID" dirty="0">
+                <a:solidFill>
+                  <a:schemeClr val="tx1"/>
+                </a:solidFill>
+              </a:rPr>
+              <a:t>Leadtime EM</a:t>
+            </a:r>
+          </a:p>
+          <a:p>
+            <a:pPr marL="342900" indent="-342900">
+              <a:buAutoNum type="arabicPeriod"/>
+            </a:pPr>
+            <a:r>
+              <a:rPr lang="en-ID" dirty="0">
+                <a:solidFill>
+                  <a:schemeClr val="tx1"/>
+                </a:solidFill>
+              </a:rPr>
+              <a:t>TMO Share</a:t>
             </a:r>
           </a:p>
         </p:txBody>
@@ -13553,4 +15143,299 @@
     </a:ext>
   </a:extLst>
 </a:theme>
+</file>
+
+<file path=ppt/theme/theme2.xml><?xml version="1.0" encoding="utf-8"?>
+<a:theme xmlns:a="http://schemas.openxmlformats.org/drawingml/2006/main" name="Office Theme">
+  <a:themeElements>
+    <a:clrScheme name="Office">
+      <a:dk1>
+        <a:sysClr val="windowText" lastClr="000000"/>
+      </a:dk1>
+      <a:lt1>
+        <a:sysClr val="window" lastClr="FFFFFF"/>
+      </a:lt1>
+      <a:dk2>
+        <a:srgbClr val="44546A"/>
+      </a:dk2>
+      <a:lt2>
+        <a:srgbClr val="E7E6E6"/>
+      </a:lt2>
+      <a:accent1>
+        <a:srgbClr val="4472C4"/>
+      </a:accent1>
+      <a:accent2>
+        <a:srgbClr val="ED7D31"/>
+      </a:accent2>
+      <a:accent3>
+        <a:srgbClr val="A5A5A5"/>
+      </a:accent3>
+      <a:accent4>
+        <a:srgbClr val="FFC000"/>
+      </a:accent4>
+      <a:accent5>
+        <a:srgbClr val="5B9BD5"/>
+      </a:accent5>
+      <a:accent6>
+        <a:srgbClr val="70AD47"/>
+      </a:accent6>
+      <a:hlink>
+        <a:srgbClr val="0563C1"/>
+      </a:hlink>
+      <a:folHlink>
+        <a:srgbClr val="954F72"/>
+      </a:folHlink>
+    </a:clrScheme>
+    <a:fontScheme name="Office">
+      <a:majorFont>
+        <a:latin typeface="Calibri Light" panose="020F0302020204030204"/>
+        <a:ea typeface=""/>
+        <a:cs typeface=""/>
+        <a:font script="Jpan" typeface="游ゴシック Light"/>
+        <a:font script="Hang" typeface="맑은 고딕"/>
+        <a:font script="Hans" typeface="等线 Light"/>
+        <a:font script="Hant" typeface="新細明體"/>
+        <a:font script="Arab" typeface="Times New Roman"/>
+        <a:font script="Hebr" typeface="Times New Roman"/>
+        <a:font script="Thai" typeface="Angsana New"/>
+        <a:font script="Ethi" typeface="Nyala"/>
+        <a:font script="Beng" typeface="Vrinda"/>
+        <a:font script="Gujr" typeface="Shruti"/>
+        <a:font script="Khmr" typeface="MoolBoran"/>
+        <a:font script="Knda" typeface="Tunga"/>
+        <a:font script="Guru" typeface="Raavi"/>
+        <a:font script="Cans" typeface="Euphemia"/>
+        <a:font script="Cher" typeface="Plantagenet Cherokee"/>
+        <a:font script="Yiii" typeface="Microsoft Yi Baiti"/>
+        <a:font script="Tibt" typeface="Microsoft Himalaya"/>
+        <a:font script="Thaa" typeface="MV Boli"/>
+        <a:font script="Deva" typeface="Mangal"/>
+        <a:font script="Telu" typeface="Gautami"/>
+        <a:font script="Taml" typeface="Latha"/>
+        <a:font script="Syrc" typeface="Estrangelo Edessa"/>
+        <a:font script="Orya" typeface="Kalinga"/>
+        <a:font script="Mlym" typeface="Kartika"/>
+        <a:font script="Laoo" typeface="DokChampa"/>
+        <a:font script="Sinh" typeface="Iskoola Pota"/>
+        <a:font script="Mong" typeface="Mongolian Baiti"/>
+        <a:font script="Viet" typeface="Times New Roman"/>
+        <a:font script="Uigh" typeface="Microsoft Uighur"/>
+        <a:font script="Geor" typeface="Sylfaen"/>
+        <a:font script="Armn" typeface="Arial"/>
+        <a:font script="Bugi" typeface="Leelawadee UI"/>
+        <a:font script="Bopo" typeface="Microsoft JhengHei"/>
+        <a:font script="Java" typeface="Javanese Text"/>
+        <a:font script="Lisu" typeface="Segoe UI"/>
+        <a:font script="Mymr" typeface="Myanmar Text"/>
+        <a:font script="Nkoo" typeface="Ebrima"/>
+        <a:font script="Olck" typeface="Nirmala UI"/>
+        <a:font script="Osma" typeface="Ebrima"/>
+        <a:font script="Phag" typeface="Phagspa"/>
+        <a:font script="Syrn" typeface="Estrangelo Edessa"/>
+        <a:font script="Syrj" typeface="Estrangelo Edessa"/>
+        <a:font script="Syre" typeface="Estrangelo Edessa"/>
+        <a:font script="Sora" typeface="Nirmala UI"/>
+        <a:font script="Tale" typeface="Microsoft Tai Le"/>
+        <a:font script="Talu" typeface="Microsoft New Tai Lue"/>
+        <a:font script="Tfng" typeface="Ebrima"/>
+      </a:majorFont>
+      <a:minorFont>
+        <a:latin typeface="Calibri" panose="020F0502020204030204"/>
+        <a:ea typeface=""/>
+        <a:cs typeface=""/>
+        <a:font script="Jpan" typeface="游ゴシック"/>
+        <a:font script="Hang" typeface="맑은 고딕"/>
+        <a:font script="Hans" typeface="等线"/>
+        <a:font script="Hant" typeface="新細明體"/>
+        <a:font script="Arab" typeface="Arial"/>
+        <a:font script="Hebr" typeface="Arial"/>
+        <a:font script="Thai" typeface="Cordia New"/>
+        <a:font script="Ethi" typeface="Nyala"/>
+        <a:font script="Beng" typeface="Vrinda"/>
+        <a:font script="Gujr" typeface="Shruti"/>
+        <a:font script="Khmr" typeface="DaunPenh"/>
+        <a:font script="Knda" typeface="Tunga"/>
+        <a:font script="Guru" typeface="Raavi"/>
+        <a:font script="Cans" typeface="Euphemia"/>
+        <a:font script="Cher" typeface="Plantagenet Cherokee"/>
+        <a:font script="Yiii" typeface="Microsoft Yi Baiti"/>
+        <a:font script="Tibt" typeface="Microsoft Himalaya"/>
+        <a:font script="Thaa" typeface="MV Boli"/>
+        <a:font script="Deva" typeface="Mangal"/>
+        <a:font script="Telu" typeface="Gautami"/>
+        <a:font script="Taml" typeface="Latha"/>
+        <a:font script="Syrc" typeface="Estrangelo Edessa"/>
+        <a:font script="Orya" typeface="Kalinga"/>
+        <a:font script="Mlym" typeface="Kartika"/>
+        <a:font script="Laoo" typeface="DokChampa"/>
+        <a:font script="Sinh" typeface="Iskoola Pota"/>
+        <a:font script="Mong" typeface="Mongolian Baiti"/>
+        <a:font script="Viet" typeface="Arial"/>
+        <a:font script="Uigh" typeface="Microsoft Uighur"/>
+        <a:font script="Geor" typeface="Sylfaen"/>
+        <a:font script="Armn" typeface="Arial"/>
+        <a:font script="Bugi" typeface="Leelawadee UI"/>
+        <a:font script="Bopo" typeface="Microsoft JhengHei"/>
+        <a:font script="Java" typeface="Javanese Text"/>
+        <a:font script="Lisu" typeface="Segoe UI"/>
+        <a:font script="Mymr" typeface="Myanmar Text"/>
+        <a:font script="Nkoo" typeface="Ebrima"/>
+        <a:font script="Olck" typeface="Nirmala UI"/>
+        <a:font script="Osma" typeface="Ebrima"/>
+        <a:font script="Phag" typeface="Phagspa"/>
+        <a:font script="Syrn" typeface="Estrangelo Edessa"/>
+        <a:font script="Syrj" typeface="Estrangelo Edessa"/>
+        <a:font script="Syre" typeface="Estrangelo Edessa"/>
+        <a:font script="Sora" typeface="Nirmala UI"/>
+        <a:font script="Tale" typeface="Microsoft Tai Le"/>
+        <a:font script="Talu" typeface="Microsoft New Tai Lue"/>
+        <a:font script="Tfng" typeface="Ebrima"/>
+      </a:minorFont>
+    </a:fontScheme>
+    <a:fmtScheme name="Office">
+      <a:fillStyleLst>
+        <a:solidFill>
+          <a:schemeClr val="phClr"/>
+        </a:solidFill>
+        <a:gradFill rotWithShape="1">
+          <a:gsLst>
+            <a:gs pos="0">
+              <a:schemeClr val="phClr">
+                <a:lumMod val="110000"/>
+                <a:satMod val="105000"/>
+                <a:tint val="67000"/>
+              </a:schemeClr>
+            </a:gs>
+            <a:gs pos="50000">
+              <a:schemeClr val="phClr">
+                <a:lumMod val="105000"/>
+                <a:satMod val="103000"/>
+                <a:tint val="73000"/>
+              </a:schemeClr>
+            </a:gs>
+            <a:gs pos="100000">
+              <a:schemeClr val="phClr">
+                <a:lumMod val="105000"/>
+                <a:satMod val="109000"/>
+                <a:tint val="81000"/>
+              </a:schemeClr>
+            </a:gs>
+          </a:gsLst>
+          <a:lin ang="5400000" scaled="0"/>
+        </a:gradFill>
+        <a:gradFill rotWithShape="1">
+          <a:gsLst>
+            <a:gs pos="0">
+              <a:schemeClr val="phClr">
+                <a:satMod val="103000"/>
+                <a:lumMod val="102000"/>
+                <a:tint val="94000"/>
+              </a:schemeClr>
+            </a:gs>
+            <a:gs pos="50000">
+              <a:schemeClr val="phClr">
+                <a:satMod val="110000"/>
+                <a:lumMod val="100000"/>
+                <a:shade val="100000"/>
+              </a:schemeClr>
+            </a:gs>
+            <a:gs pos="100000">
+              <a:schemeClr val="phClr">
+                <a:lumMod val="99000"/>
+                <a:satMod val="120000"/>
+                <a:shade val="78000"/>
+              </a:schemeClr>
+            </a:gs>
+          </a:gsLst>
+          <a:lin ang="5400000" scaled="0"/>
+        </a:gradFill>
+      </a:fillStyleLst>
+      <a:lnStyleLst>
+        <a:ln w="6350" cap="flat" cmpd="sng" algn="ctr">
+          <a:solidFill>
+            <a:schemeClr val="phClr"/>
+          </a:solidFill>
+          <a:prstDash val="solid"/>
+          <a:miter lim="800000"/>
+        </a:ln>
+        <a:ln w="12700" cap="flat" cmpd="sng" algn="ctr">
+          <a:solidFill>
+            <a:schemeClr val="phClr"/>
+          </a:solidFill>
+          <a:prstDash val="solid"/>
+          <a:miter lim="800000"/>
+        </a:ln>
+        <a:ln w="19050" cap="flat" cmpd="sng" algn="ctr">
+          <a:solidFill>
+            <a:schemeClr val="phClr"/>
+          </a:solidFill>
+          <a:prstDash val="solid"/>
+          <a:miter lim="800000"/>
+        </a:ln>
+      </a:lnStyleLst>
+      <a:effectStyleLst>
+        <a:effectStyle>
+          <a:effectLst/>
+        </a:effectStyle>
+        <a:effectStyle>
+          <a:effectLst/>
+        </a:effectStyle>
+        <a:effectStyle>
+          <a:effectLst>
+            <a:outerShdw blurRad="57150" dist="19050" dir="5400000" algn="ctr" rotWithShape="0">
+              <a:srgbClr val="000000">
+                <a:alpha val="63000"/>
+              </a:srgbClr>
+            </a:outerShdw>
+          </a:effectLst>
+        </a:effectStyle>
+      </a:effectStyleLst>
+      <a:bgFillStyleLst>
+        <a:solidFill>
+          <a:schemeClr val="phClr"/>
+        </a:solidFill>
+        <a:solidFill>
+          <a:schemeClr val="phClr">
+            <a:tint val="95000"/>
+            <a:satMod val="170000"/>
+          </a:schemeClr>
+        </a:solidFill>
+        <a:gradFill rotWithShape="1">
+          <a:gsLst>
+            <a:gs pos="0">
+              <a:schemeClr val="phClr">
+                <a:tint val="93000"/>
+                <a:satMod val="150000"/>
+                <a:shade val="98000"/>
+                <a:lumMod val="102000"/>
+              </a:schemeClr>
+            </a:gs>
+            <a:gs pos="50000">
+              <a:schemeClr val="phClr">
+                <a:tint val="98000"/>
+                <a:satMod val="130000"/>
+                <a:shade val="90000"/>
+                <a:lumMod val="103000"/>
+              </a:schemeClr>
+            </a:gs>
+            <a:gs pos="100000">
+              <a:schemeClr val="phClr">
+                <a:shade val="63000"/>
+                <a:satMod val="120000"/>
+              </a:schemeClr>
+            </a:gs>
+          </a:gsLst>
+          <a:lin ang="5400000" scaled="0"/>
+        </a:gradFill>
+      </a:bgFillStyleLst>
+    </a:fmtScheme>
+  </a:themeElements>
+  <a:objectDefaults/>
+  <a:extraClrSchemeLst/>
+  <a:extLst>
+    <a:ext uri="{05A4C25C-085E-4340-85A3-A5531E510DB2}">
+      <thm15:themeFamily xmlns:thm15="http://schemas.microsoft.com/office/thememl/2012/main" name="Office Theme" id="{62F939B6-93AF-4DB8-9C6B-D6C7DFDC589F}" vid="{4A3C46E8-61CC-4603-A589-7422A47A8E4A}"/>
+    </a:ext>
+  </a:extLst>
+</a:theme>
 </file>
</xml_diff>